<commit_message>
pre test run tweaks
</commit_message>
<xml_diff>
--- a/instructors/04_Files-organization_v3.0.pptx
+++ b/instructors/04_Files-organization_v3.0.pptx
@@ -222,7 +222,7 @@
           <a:p>
             <a:fld id="{585C48AE-4A1E-9A43-835F-510354165F99}" type="datetimeFigureOut">
               <a:rPr lang="en-GB" smtClean="0"/>
-              <a:t>17/01/2023</a:t>
+              <a:t>21/03/2024</a:t>
             </a:fld>
             <a:endParaRPr lang="en-GB"/>
           </a:p>
@@ -2353,7 +2353,7 @@
           <a:p>
             <a:fld id="{5913FB77-D8DB-4AB9-8EA5-EE8C3B57A5E1}" type="datetimeFigureOut">
               <a:rPr lang="en-GB" smtClean="0"/>
-              <a:t>17/01/2023</a:t>
+              <a:t>21/03/2024</a:t>
             </a:fld>
             <a:endParaRPr lang="en-GB"/>
           </a:p>
@@ -2600,7 +2600,7 @@
           <a:p>
             <a:fld id="{5913FB77-D8DB-4AB9-8EA5-EE8C3B57A5E1}" type="datetimeFigureOut">
               <a:rPr lang="en-GB" smtClean="0"/>
-              <a:t>17/01/2023</a:t>
+              <a:t>21/03/2024</a:t>
             </a:fld>
             <a:endParaRPr lang="en-GB"/>
           </a:p>
@@ -2810,7 +2810,7 @@
           <a:p>
             <a:fld id="{5913FB77-D8DB-4AB9-8EA5-EE8C3B57A5E1}" type="datetimeFigureOut">
               <a:rPr lang="en-GB" smtClean="0"/>
-              <a:t>17/01/2023</a:t>
+              <a:t>21/03/2024</a:t>
             </a:fld>
             <a:endParaRPr lang="en-GB"/>
           </a:p>
@@ -3010,7 +3010,7 @@
           <a:p>
             <a:fld id="{5913FB77-D8DB-4AB9-8EA5-EE8C3B57A5E1}" type="datetimeFigureOut">
               <a:rPr lang="en-GB" smtClean="0"/>
-              <a:t>17/01/2023</a:t>
+              <a:t>21/03/2024</a:t>
             </a:fld>
             <a:endParaRPr lang="en-GB"/>
           </a:p>
@@ -3286,7 +3286,7 @@
           <a:p>
             <a:fld id="{5913FB77-D8DB-4AB9-8EA5-EE8C3B57A5E1}" type="datetimeFigureOut">
               <a:rPr lang="en-GB" smtClean="0"/>
-              <a:t>17/01/2023</a:t>
+              <a:t>21/03/2024</a:t>
             </a:fld>
             <a:endParaRPr lang="en-GB"/>
           </a:p>
@@ -3554,7 +3554,7 @@
           <a:p>
             <a:fld id="{5913FB77-D8DB-4AB9-8EA5-EE8C3B57A5E1}" type="datetimeFigureOut">
               <a:rPr lang="en-GB" smtClean="0"/>
-              <a:t>17/01/2023</a:t>
+              <a:t>21/03/2024</a:t>
             </a:fld>
             <a:endParaRPr lang="en-GB"/>
           </a:p>
@@ -3969,7 +3969,7 @@
           <a:p>
             <a:fld id="{5913FB77-D8DB-4AB9-8EA5-EE8C3B57A5E1}" type="datetimeFigureOut">
               <a:rPr lang="en-GB" smtClean="0"/>
-              <a:t>17/01/2023</a:t>
+              <a:t>21/03/2024</a:t>
             </a:fld>
             <a:endParaRPr lang="en-GB"/>
           </a:p>
@@ -4111,7 +4111,7 @@
           <a:p>
             <a:fld id="{5913FB77-D8DB-4AB9-8EA5-EE8C3B57A5E1}" type="datetimeFigureOut">
               <a:rPr lang="en-GB" smtClean="0"/>
-              <a:t>17/01/2023</a:t>
+              <a:t>21/03/2024</a:t>
             </a:fld>
             <a:endParaRPr lang="en-GB"/>
           </a:p>
@@ -4224,7 +4224,7 @@
           <a:p>
             <a:fld id="{5913FB77-D8DB-4AB9-8EA5-EE8C3B57A5E1}" type="datetimeFigureOut">
               <a:rPr lang="en-GB" smtClean="0"/>
-              <a:t>17/01/2023</a:t>
+              <a:t>21/03/2024</a:t>
             </a:fld>
             <a:endParaRPr lang="en-GB"/>
           </a:p>
@@ -4537,7 +4537,7 @@
           <a:p>
             <a:fld id="{5913FB77-D8DB-4AB9-8EA5-EE8C3B57A5E1}" type="datetimeFigureOut">
               <a:rPr lang="en-GB" smtClean="0"/>
-              <a:t>17/01/2023</a:t>
+              <a:t>21/03/2024</a:t>
             </a:fld>
             <a:endParaRPr lang="en-GB"/>
           </a:p>
@@ -4826,7 +4826,7 @@
           <a:p>
             <a:fld id="{5913FB77-D8DB-4AB9-8EA5-EE8C3B57A5E1}" type="datetimeFigureOut">
               <a:rPr lang="en-GB" smtClean="0"/>
-              <a:t>17/01/2023</a:t>
+              <a:t>21/03/2024</a:t>
             </a:fld>
             <a:endParaRPr lang="en-GB"/>
           </a:p>
@@ -5068,7 +5068,7 @@
             <a:fld id="{5913FB77-D8DB-4AB9-8EA5-EE8C3B57A5E1}" type="datetimeFigureOut">
               <a:rPr lang="en-GB" smtClean="0"/>
               <a:pPr/>
-              <a:t>17/01/2023</a:t>
+              <a:t>21/03/2024</a:t>
             </a:fld>
             <a:endParaRPr lang="en-GB"/>
           </a:p>
@@ -5941,7 +5941,23 @@
                   <a:srgbClr val="0070C0"/>
                 </a:solidFill>
               </a:rPr>
-              <a:t>Add a PROJECT_STRUCTURE (README) file in your top directory which details your naming convention, directory structure and abbreviations</a:t>
+              <a:t>Add a README</a:t>
+            </a:r>
+            <a:r>
+              <a:rPr lang="pl-PL" sz="2800" dirty="0">
+                <a:solidFill>
+                  <a:srgbClr val="0070C0"/>
+                </a:solidFill>
+              </a:rPr>
+              <a:t> with </a:t>
+            </a:r>
+            <a:r>
+              <a:rPr lang="en-GB" sz="2800" dirty="0">
+                <a:solidFill>
+                  <a:srgbClr val="0070C0"/>
+                </a:solidFill>
+              </a:rPr>
+              <a:t>PROJECT_STRUCTURE  in your top directory which details your naming convention, directory structure and abbreviations</a:t>
             </a:r>
           </a:p>
         </p:txBody>
@@ -6166,14 +6182,6 @@
               </a:rPr>
               <a:t> special characters </a:t>
             </a:r>
-            <a:r>
-              <a:rPr lang="pl-PL" sz="2800" dirty="0">
-                <a:solidFill>
-                  <a:srgbClr val="0070C0"/>
-                </a:solidFill>
-              </a:rPr>
-              <a:t/>
-            </a:r>
             <a:br>
               <a:rPr lang="pl-PL" sz="2800" dirty="0">
                 <a:solidFill>
@@ -6472,14 +6480,6 @@
               </a:rPr>
               <a:t>elements</a:t>
             </a:r>
-            <a:r>
-              <a:rPr lang="pl-PL" sz="2800" dirty="0">
-                <a:solidFill>
-                  <a:srgbClr val="0070C0"/>
-                </a:solidFill>
-              </a:rPr>
-              <a:t/>
-            </a:r>
             <a:br>
               <a:rPr lang="pl-PL" sz="2800" dirty="0">
                 <a:solidFill>
@@ -6577,14 +6577,6 @@
               </a:rPr>
               <a:t> deep paths with long names </a:t>
             </a:r>
-            <a:r>
-              <a:rPr lang="pl-PL" sz="2800" dirty="0">
-                <a:solidFill>
-                  <a:srgbClr val="0070C0"/>
-                </a:solidFill>
-              </a:rPr>
-              <a:t/>
-            </a:r>
             <a:br>
               <a:rPr lang="pl-PL" sz="2800" dirty="0">
                 <a:solidFill>
@@ -6599,14 +6591,6 @@
                 </a:solidFill>
               </a:rPr>
               <a:t>(i.e. deeply nested folders with long names) </a:t>
-            </a:r>
-            <a:r>
-              <a:rPr lang="pl-PL" sz="2800" dirty="0">
-                <a:solidFill>
-                  <a:srgbClr val="0070C0"/>
-                </a:solidFill>
-              </a:rPr>
-              <a:t/>
             </a:r>
             <a:br>
               <a:rPr lang="pl-PL" sz="2800" dirty="0">
@@ -7886,14 +7870,6 @@
             </a:r>
           </a:p>
           <a:p>
-            <a:r>
-              <a:rPr lang="en-GB" sz="2800" dirty="0">
-                <a:solidFill>
-                  <a:srgbClr val="0070C0"/>
-                </a:solidFill>
-              </a:rPr>
-              <a:t/>
-            </a:r>
             <a:br>
               <a:rPr lang="en-GB" sz="2800" dirty="0">
                 <a:solidFill>
@@ -8658,14 +8634,6 @@
               </a:rPr>
               <a:t>If you change the strategy document it in PROJECT_STRUCTURE </a:t>
             </a:r>
-            <a:r>
-              <a:rPr lang="pl-PL" sz="2800" dirty="0">
-                <a:solidFill>
-                  <a:srgbClr val="0070C0"/>
-                </a:solidFill>
-              </a:rPr>
-              <a:t/>
-            </a:r>
             <a:br>
               <a:rPr lang="pl-PL" sz="2800" dirty="0">
                 <a:solidFill>
@@ -8955,7 +8923,7 @@
               </a:lnSpc>
             </a:pPr>
             <a:r>
-              <a:rPr lang="pl-PL" sz="4000" dirty="0" smtClean="0">
+              <a:rPr lang="pl-PL" sz="4000" dirty="0">
                 <a:solidFill>
                   <a:srgbClr val="0070C0"/>
                 </a:solidFill>
@@ -9033,30 +9001,14 @@
               <a:buChar char="•"/>
             </a:pPr>
             <a:r>
-              <a:rPr lang="en-GB" sz="2800" dirty="0" smtClean="0">
-                <a:solidFill>
-                  <a:srgbClr val="0070C0"/>
-                </a:solidFill>
-              </a:rPr>
-              <a:t>A </a:t>
-            </a:r>
-            <a:r>
               <a:rPr lang="en-GB" sz="2800" dirty="0">
                 <a:solidFill>
                   <a:srgbClr val="0070C0"/>
                 </a:solidFill>
               </a:rPr>
-              <a:t>good file name suggests the file </a:t>
-            </a:r>
-            <a:r>
-              <a:rPr lang="en-GB" sz="2800" dirty="0" smtClean="0">
-                <a:solidFill>
-                  <a:srgbClr val="0070C0"/>
-                </a:solidFill>
-              </a:rPr>
-              <a:t>content</a:t>
-            </a:r>
-            <a:endParaRPr lang="pl-PL" sz="2800" dirty="0" smtClean="0">
+              <a:t>A good file name suggests the file content</a:t>
+            </a:r>
+            <a:endParaRPr lang="pl-PL" sz="2800" dirty="0">
               <a:solidFill>
                 <a:srgbClr val="0070C0"/>
               </a:solidFill>
@@ -9079,30 +9031,14 @@
               <a:buChar char="•"/>
             </a:pPr>
             <a:r>
-              <a:rPr lang="en-GB" sz="2800" dirty="0" smtClean="0">
-                <a:solidFill>
-                  <a:srgbClr val="0070C0"/>
-                </a:solidFill>
-              </a:rPr>
-              <a:t>Good </a:t>
-            </a:r>
-            <a:r>
               <a:rPr lang="en-GB" sz="2800" dirty="0">
                 <a:solidFill>
                   <a:srgbClr val="0070C0"/>
                 </a:solidFill>
               </a:rPr>
-              <a:t>project organization saves you </a:t>
-            </a:r>
-            <a:r>
-              <a:rPr lang="en-GB" sz="2800" dirty="0" smtClean="0">
-                <a:solidFill>
-                  <a:srgbClr val="0070C0"/>
-                </a:solidFill>
-              </a:rPr>
-              <a:t>time</a:t>
-            </a:r>
-            <a:endParaRPr lang="pl-PL" sz="2800" dirty="0" smtClean="0">
+              <a:t>Good project organization saves you time</a:t>
+            </a:r>
+            <a:endParaRPr lang="pl-PL" sz="2800" dirty="0">
               <a:solidFill>
                 <a:srgbClr val="0070C0"/>
               </a:solidFill>
@@ -9125,34 +9061,13 @@
               <a:buChar char="•"/>
             </a:pPr>
             <a:r>
-              <a:rPr lang="en-GB" sz="2800" dirty="0" smtClean="0">
-                <a:solidFill>
-                  <a:srgbClr val="0070C0"/>
-                </a:solidFill>
-              </a:rPr>
-              <a:t>Describe </a:t>
-            </a:r>
-            <a:r>
               <a:rPr lang="en-GB" sz="2800" dirty="0">
                 <a:solidFill>
                   <a:srgbClr val="0070C0"/>
                 </a:solidFill>
               </a:rPr>
-              <a:t>your files organization in PROJECT_STRUCTURE or README including naming </a:t>
-            </a:r>
-            <a:r>
-              <a:rPr lang="en-GB" sz="2800" dirty="0" smtClean="0">
-                <a:solidFill>
-                  <a:srgbClr val="0070C0"/>
-                </a:solidFill>
-              </a:rPr>
-              <a:t>convention</a:t>
-            </a:r>
-            <a:endParaRPr lang="en-GB" sz="2800" dirty="0">
-              <a:solidFill>
-                <a:srgbClr val="0070C0"/>
-              </a:solidFill>
-            </a:endParaRPr>
+              <a:t>Describe your files organization in PROJECT_STRUCTURE or README including naming convention</a:t>
+            </a:r>
           </a:p>
         </p:txBody>
       </p:sp>
@@ -9230,7 +9145,7 @@
           <a:lstStyle/>
           <a:p>
             <a:r>
-              <a:rPr lang="pl-PL" dirty="0" smtClean="0"/>
+              <a:rPr lang="pl-PL" dirty="0"/>
               <a:t>Key points</a:t>
             </a:r>
             <a:endParaRPr lang="en-GB" dirty="0"/>
@@ -9300,7 +9215,7 @@
               <a:buChar char="•"/>
             </a:pPr>
             <a:r>
-              <a:rPr lang="pl-PL" sz="2800" dirty="0" smtClean="0">
+              <a:rPr lang="pl-PL" sz="2800" dirty="0">
                 <a:solidFill>
                   <a:srgbClr val="0070C0"/>
                 </a:solidFill>
@@ -9308,20 +9223,12 @@
               <a:t>Find</a:t>
             </a:r>
             <a:r>
-              <a:rPr lang="en-GB" sz="2800" dirty="0" smtClean="0">
-                <a:solidFill>
-                  <a:srgbClr val="0070C0"/>
-                </a:solidFill>
-              </a:rPr>
-              <a:t> </a:t>
-            </a:r>
-            <a:r>
               <a:rPr lang="en-GB" sz="2800" dirty="0">
                 <a:solidFill>
                   <a:srgbClr val="0070C0"/>
                 </a:solidFill>
               </a:rPr>
-              <a:t>files</a:t>
+              <a:t> files</a:t>
             </a:r>
             <a:r>
               <a:rPr lang="pl-PL" sz="2800" dirty="0">
@@ -10457,14 +10364,6 @@
                 </a:solidFill>
               </a:rPr>
             </a:br>
-            <a:r>
-              <a:rPr lang="pl-PL" sz="2800" dirty="0">
-                <a:solidFill>
-                  <a:srgbClr val="0070C0"/>
-                </a:solidFill>
-              </a:rPr>
-              <a:t/>
-            </a:r>
             <a:br>
               <a:rPr lang="pl-PL" sz="2800" dirty="0">
                 <a:solidFill>
@@ -10495,14 +10394,6 @@
                 </a:solidFill>
               </a:rPr>
             </a:br>
-            <a:r>
-              <a:rPr lang="pl-PL" sz="2400" dirty="0">
-                <a:solidFill>
-                  <a:srgbClr val="0070C0"/>
-                </a:solidFill>
-              </a:rPr>
-              <a:t/>
-            </a:r>
             <a:br>
               <a:rPr lang="pl-PL" sz="2400" dirty="0">
                 <a:solidFill>
@@ -10571,14 +10462,6 @@
                 </a:solidFill>
               </a:rPr>
             </a:br>
-            <a:r>
-              <a:rPr lang="pl-PL" sz="2800" dirty="0">
-                <a:solidFill>
-                  <a:srgbClr val="0070C0"/>
-                </a:solidFill>
-              </a:rPr>
-              <a:t/>
-            </a:r>
             <a:br>
               <a:rPr lang="pl-PL" sz="2800" dirty="0">
                 <a:solidFill>
@@ -10891,14 +10774,6 @@
                 </a:solidFill>
               </a:rPr>
             </a:br>
-            <a:r>
-              <a:rPr lang="pl-PL" sz="2800" dirty="0">
-                <a:solidFill>
-                  <a:srgbClr val="0070C0"/>
-                </a:solidFill>
-              </a:rPr>
-              <a:t/>
-            </a:r>
             <a:br>
               <a:rPr lang="pl-PL" sz="2800" dirty="0">
                 <a:solidFill>

</xml_diff>

<commit_message>
tweaks after the delivery
</commit_message>
<xml_diff>
--- a/instructors/04_Files-organization_v3.0.pptx
+++ b/instructors/04_Files-organization_v3.0.pptx
@@ -5,7 +5,7 @@
     <p:sldMasterId id="2147483648" r:id="rId1"/>
   </p:sldMasterIdLst>
   <p:notesMasterIdLst>
-    <p:notesMasterId r:id="rId28"/>
+    <p:notesMasterId r:id="rId27"/>
   </p:notesMasterIdLst>
   <p:sldIdLst>
     <p:sldId id="280" r:id="rId2"/>
@@ -22,18 +22,17 @@
     <p:sldId id="277" r:id="rId13"/>
     <p:sldId id="285" r:id="rId14"/>
     <p:sldId id="273" r:id="rId15"/>
-    <p:sldId id="295" r:id="rId16"/>
-    <p:sldId id="287" r:id="rId17"/>
-    <p:sldId id="286" r:id="rId18"/>
-    <p:sldId id="288" r:id="rId19"/>
-    <p:sldId id="289" r:id="rId20"/>
+    <p:sldId id="287" r:id="rId16"/>
+    <p:sldId id="286" r:id="rId17"/>
+    <p:sldId id="288" r:id="rId18"/>
+    <p:sldId id="289" r:id="rId19"/>
+    <p:sldId id="290" r:id="rId20"/>
     <p:sldId id="278" r:id="rId21"/>
-    <p:sldId id="290" r:id="rId22"/>
-    <p:sldId id="262" r:id="rId23"/>
-    <p:sldId id="272" r:id="rId24"/>
-    <p:sldId id="291" r:id="rId25"/>
-    <p:sldId id="258" r:id="rId26"/>
-    <p:sldId id="296" r:id="rId27"/>
+    <p:sldId id="262" r:id="rId22"/>
+    <p:sldId id="272" r:id="rId23"/>
+    <p:sldId id="291" r:id="rId24"/>
+    <p:sldId id="258" r:id="rId25"/>
+    <p:sldId id="296" r:id="rId26"/>
   </p:sldIdLst>
   <p:sldSz cx="12192000" cy="6858000"/>
   <p:notesSz cx="6858000" cy="9144000"/>
@@ -222,7 +221,7 @@
           <a:p>
             <a:fld id="{585C48AE-4A1E-9A43-835F-510354165F99}" type="datetimeFigureOut">
               <a:rPr lang="en-GB" smtClean="0"/>
-              <a:t>21/03/2024</a:t>
+              <a:t>22/03/2024</a:t>
             </a:fld>
             <a:endParaRPr lang="en-GB"/>
           </a:p>
@@ -1101,35 +1100,29 @@
           <a:bodyPr/>
           <a:lstStyle/>
           <a:p>
-            <a:pPr algn="l">
-              <a:buFont typeface="Arial" panose="020B0604020202020204" pitchFamily="34" charset="0"/>
-              <a:buChar char="•"/>
-            </a:pPr>
-            <a:r>
-              <a:rPr lang="pt-BR" b="0" i="0" dirty="0">
+            <a:pPr algn="l"/>
+            <a:r>
+              <a:rPr lang="en-GB" b="0" i="0" dirty="0">
                 <a:solidFill>
                   <a:srgbClr val="333333"/>
                 </a:solidFill>
                 <a:effectLst/>
                 <a:latin typeface="Ubuntu"/>
               </a:rPr>
-              <a:t>1 b)</a:t>
-            </a:r>
-          </a:p>
-          <a:p>
-            <a:pPr algn="l">
-              <a:buFont typeface="Arial" panose="020B0604020202020204" pitchFamily="34" charset="0"/>
-              <a:buChar char="•"/>
-            </a:pPr>
-            <a:r>
-              <a:rPr lang="pt-BR" b="0" i="0" dirty="0">
+              <a:t>Establishing a system that allows you to access your files, avoid duplication and ensure that your data can be easily found needs planning.</a:t>
+            </a:r>
+          </a:p>
+          <a:p>
+            <a:pPr algn="l"/>
+            <a:r>
+              <a:rPr lang="en-GB" b="0" i="0" dirty="0">
                 <a:solidFill>
                   <a:srgbClr val="333333"/>
                 </a:solidFill>
                 <a:effectLst/>
                 <a:latin typeface="Ubuntu"/>
               </a:rPr>
-              <a:t>2 a)</a:t>
+              <a:t>You can start by developing a logical folder structure. To do so, you need to take into account the following suggestions:</a:t>
             </a:r>
           </a:p>
           <a:p>
@@ -1138,14 +1131,62 @@
               <a:buChar char="•"/>
             </a:pPr>
             <a:r>
-              <a:rPr lang="pt-BR" b="0" i="0" dirty="0">
+              <a:rPr lang="en-GB" b="0" i="0" dirty="0">
                 <a:solidFill>
                   <a:srgbClr val="333333"/>
                 </a:solidFill>
                 <a:effectLst/>
                 <a:latin typeface="Ubuntu"/>
               </a:rPr>
-              <a:t>3 b)</a:t>
+              <a:t>Use folders to group related files. A single folder will make it easy to locate them.</a:t>
+            </a:r>
+          </a:p>
+          <a:p>
+            <a:pPr algn="l">
+              <a:buFont typeface="Arial" panose="020B0604020202020204" pitchFamily="34" charset="0"/>
+              <a:buChar char="•"/>
+            </a:pPr>
+            <a:r>
+              <a:rPr lang="en-GB" b="0" i="0" dirty="0">
+                <a:solidFill>
+                  <a:srgbClr val="333333"/>
+                </a:solidFill>
+                <a:effectLst/>
+                <a:latin typeface="Ubuntu"/>
+              </a:rPr>
+              <a:t>Name folders appropriately: use descriptive names after the areas of work to which they relate.</a:t>
+            </a:r>
+          </a:p>
+          <a:p>
+            <a:pPr algn="l">
+              <a:buFont typeface="Arial" panose="020B0604020202020204" pitchFamily="34" charset="0"/>
+              <a:buChar char="•"/>
+            </a:pPr>
+            <a:r>
+              <a:rPr lang="en-GB" b="0" i="0" dirty="0">
+                <a:solidFill>
+                  <a:srgbClr val="333333"/>
+                </a:solidFill>
+                <a:effectLst/>
+                <a:latin typeface="Ubuntu"/>
+              </a:rPr>
+              <a:t>Structure folders hierarchically: use broader topics for your main folders and increase in specificity as you go down the hierarchy.</a:t>
+            </a:r>
+          </a:p>
+          <a:p>
+            <a:pPr algn="l">
+              <a:buFont typeface="Arial" panose="020B0604020202020204" pitchFamily="34" charset="0"/>
+              <a:buChar char="•"/>
+            </a:pPr>
+            <a:r>
+              <a:rPr lang="en-GB" b="0" i="0" dirty="0">
+                <a:solidFill>
+                  <a:srgbClr val="333333"/>
+                </a:solidFill>
+                <a:effectLst/>
+                <a:latin typeface="Ubuntu"/>
+              </a:rPr>
+              <a:t>Be consistent: agree on a naming convention from the outset of your research project.</a:t>
             </a:r>
           </a:p>
           <a:p>
@@ -1179,7 +1220,7 @@
     </p:spTree>
     <p:extLst>
       <p:ext uri="{BB962C8B-B14F-4D97-AF65-F5344CB8AC3E}">
-        <p14:creationId xmlns:p14="http://schemas.microsoft.com/office/powerpoint/2010/main" val="114370202"/>
+        <p14:creationId xmlns:p14="http://schemas.microsoft.com/office/powerpoint/2010/main" val="3880669736"/>
       </p:ext>
     </p:extLst>
   </p:cSld>
@@ -1242,8 +1283,18 @@
                 <a:effectLst/>
                 <a:latin typeface="Ubuntu"/>
               </a:rPr>
-              <a:t>Establishing a system that allows you to access your files, avoid duplication and ensure that your data can be easily found needs planning.</a:t>
-            </a:r>
+              <a:t>Your naming conventions might need some adjustments as the project progresses. Don’t despair, just document it!</a:t>
+            </a:r>
+          </a:p>
+          <a:p>
+            <a:pPr algn="l"/>
+            <a:endParaRPr lang="en-GB" b="0" i="0" dirty="0">
+              <a:solidFill>
+                <a:srgbClr val="333333"/>
+              </a:solidFill>
+              <a:effectLst/>
+              <a:latin typeface="Ubuntu"/>
+            </a:endParaRPr>
           </a:p>
           <a:p>
             <a:pPr algn="l"/>
@@ -1255,71 +1306,7 @@
                 <a:effectLst/>
                 <a:latin typeface="Ubuntu"/>
               </a:rPr>
-              <a:t>You can start by developing a logical folder structure. To do so, you need to take into account the following suggestions:</a:t>
-            </a:r>
-          </a:p>
-          <a:p>
-            <a:pPr algn="l">
-              <a:buFont typeface="Arial" panose="020B0604020202020204" pitchFamily="34" charset="0"/>
-              <a:buChar char="•"/>
-            </a:pPr>
-            <a:r>
-              <a:rPr lang="en-GB" b="0" i="0" dirty="0">
-                <a:solidFill>
-                  <a:srgbClr val="333333"/>
-                </a:solidFill>
-                <a:effectLst/>
-                <a:latin typeface="Ubuntu"/>
-              </a:rPr>
-              <a:t>Use folders to group related files. A single folder will make it easy to locate them.</a:t>
-            </a:r>
-          </a:p>
-          <a:p>
-            <a:pPr algn="l">
-              <a:buFont typeface="Arial" panose="020B0604020202020204" pitchFamily="34" charset="0"/>
-              <a:buChar char="•"/>
-            </a:pPr>
-            <a:r>
-              <a:rPr lang="en-GB" b="0" i="0" dirty="0">
-                <a:solidFill>
-                  <a:srgbClr val="333333"/>
-                </a:solidFill>
-                <a:effectLst/>
-                <a:latin typeface="Ubuntu"/>
-              </a:rPr>
-              <a:t>Name folders appropriately: use descriptive names after the areas of work to which they relate.</a:t>
-            </a:r>
-          </a:p>
-          <a:p>
-            <a:pPr algn="l">
-              <a:buFont typeface="Arial" panose="020B0604020202020204" pitchFamily="34" charset="0"/>
-              <a:buChar char="•"/>
-            </a:pPr>
-            <a:r>
-              <a:rPr lang="en-GB" b="0" i="0" dirty="0">
-                <a:solidFill>
-                  <a:srgbClr val="333333"/>
-                </a:solidFill>
-                <a:effectLst/>
-                <a:latin typeface="Ubuntu"/>
-              </a:rPr>
-              <a:t>Structure folders hierarchically: use broader topics for your main folders and increase in specificity as you go down the hierarchy.</a:t>
-            </a:r>
-          </a:p>
-          <a:p>
-            <a:pPr algn="l">
-              <a:buFont typeface="Arial" panose="020B0604020202020204" pitchFamily="34" charset="0"/>
-              <a:buChar char="•"/>
-            </a:pPr>
-            <a:r>
-              <a:rPr lang="en-GB" b="0" i="0" dirty="0">
-                <a:solidFill>
-                  <a:srgbClr val="333333"/>
-                </a:solidFill>
-                <a:effectLst/>
-                <a:latin typeface="Ubuntu"/>
-              </a:rPr>
-              <a:t>Be consistent: agree on a naming convention from the outset of your research project.</a:t>
+              <a:t>If you change the strategy document it in PROJECT_STRUCTURE (or README) stating why you made the change and when. Update the locations and names of files which followed the old convention</a:t>
             </a:r>
           </a:p>
           <a:p>
@@ -1344,7 +1331,7 @@
           <a:p>
             <a:fld id="{B361C124-7373-F149-A166-BB8240B9FE77}" type="slidenum">
               <a:rPr lang="en-GB" smtClean="0"/>
-              <a:t>16</a:t>
+              <a:t>20</a:t>
             </a:fld>
             <a:endParaRPr lang="en-GB"/>
           </a:p>
@@ -1353,7 +1340,7 @@
     </p:spTree>
     <p:extLst>
       <p:ext uri="{BB962C8B-B14F-4D97-AF65-F5344CB8AC3E}">
-        <p14:creationId xmlns:p14="http://schemas.microsoft.com/office/powerpoint/2010/main" val="3880669736"/>
+        <p14:creationId xmlns:p14="http://schemas.microsoft.com/office/powerpoint/2010/main" val="893431622"/>
       </p:ext>
     </p:extLst>
   </p:cSld>
@@ -1416,11 +1403,203 @@
                 <a:effectLst/>
                 <a:latin typeface="Ubuntu"/>
               </a:rPr>
-              <a:t>Your naming conventions might need some adjustments as the project progresses. Don’t despair, just document it!</a:t>
-            </a:r>
-          </a:p>
-          <a:p>
-            <a:pPr algn="l"/>
+              <a:t>The </a:t>
+            </a:r>
+            <a:r>
+              <a:rPr lang="en-GB" b="0" i="0" u="none" strike="noStrike" dirty="0">
+                <a:solidFill>
+                  <a:srgbClr val="196EBD"/>
+                </a:solidFill>
+                <a:effectLst/>
+                <a:latin typeface="Ubuntu"/>
+                <a:hlinkClick r:id="rId3"/>
+              </a:rPr>
+              <a:t>Good enough practices in scientific computing</a:t>
+            </a:r>
+            <a:r>
+              <a:rPr lang="en-GB" b="0" i="0" dirty="0">
+                <a:solidFill>
+                  <a:srgbClr val="333333"/>
+                </a:solidFill>
+                <a:effectLst/>
+                <a:latin typeface="Ubuntu"/>
+              </a:rPr>
+              <a:t> paper makes the following simple recommendations:</a:t>
+            </a:r>
+          </a:p>
+          <a:p>
+            <a:pPr algn="l">
+              <a:buFont typeface="Arial" panose="020B0604020202020204" pitchFamily="34" charset="0"/>
+              <a:buChar char="•"/>
+            </a:pPr>
+            <a:r>
+              <a:rPr lang="en-GB" b="0" i="0" dirty="0">
+                <a:solidFill>
+                  <a:srgbClr val="333333"/>
+                </a:solidFill>
+                <a:effectLst/>
+                <a:latin typeface="Ubuntu"/>
+              </a:rPr>
+              <a:t>Put each project in its own directory, which is named after the project</a:t>
+            </a:r>
+          </a:p>
+          <a:p>
+            <a:pPr algn="l">
+              <a:buFont typeface="Arial" panose="020B0604020202020204" pitchFamily="34" charset="0"/>
+              <a:buChar char="•"/>
+            </a:pPr>
+            <a:r>
+              <a:rPr lang="en-GB" b="0" i="0" dirty="0">
+                <a:solidFill>
+                  <a:srgbClr val="333333"/>
+                </a:solidFill>
+                <a:effectLst/>
+                <a:latin typeface="Ubuntu"/>
+              </a:rPr>
+              <a:t>Put text documents associated with the project in the ‘doc’ directory</a:t>
+            </a:r>
+          </a:p>
+          <a:p>
+            <a:pPr algn="l">
+              <a:buFont typeface="Arial" panose="020B0604020202020204" pitchFamily="34" charset="0"/>
+              <a:buChar char="•"/>
+            </a:pPr>
+            <a:r>
+              <a:rPr lang="en-GB" b="0" i="0" dirty="0">
+                <a:solidFill>
+                  <a:srgbClr val="333333"/>
+                </a:solidFill>
+                <a:effectLst/>
+                <a:latin typeface="Ubuntu"/>
+              </a:rPr>
+              <a:t>Put raw data and metadata in a ‘data’ directory</a:t>
+            </a:r>
+          </a:p>
+          <a:p>
+            <a:pPr algn="l">
+              <a:buFont typeface="Arial" panose="020B0604020202020204" pitchFamily="34" charset="0"/>
+              <a:buChar char="•"/>
+            </a:pPr>
+            <a:r>
+              <a:rPr lang="en-GB" b="0" i="0" dirty="0">
+                <a:solidFill>
+                  <a:srgbClr val="333333"/>
+                </a:solidFill>
+                <a:effectLst/>
+                <a:latin typeface="Ubuntu"/>
+              </a:rPr>
+              <a:t>Put files generated during </a:t>
+            </a:r>
+            <a:r>
+              <a:rPr lang="en-GB" b="0" i="0" dirty="0" err="1">
+                <a:solidFill>
+                  <a:srgbClr val="333333"/>
+                </a:solidFill>
+                <a:effectLst/>
+                <a:latin typeface="Ubuntu"/>
+              </a:rPr>
+              <a:t>cleanup</a:t>
+            </a:r>
+            <a:r>
+              <a:rPr lang="en-GB" b="0" i="0" dirty="0">
+                <a:solidFill>
+                  <a:srgbClr val="333333"/>
+                </a:solidFill>
+                <a:effectLst/>
+                <a:latin typeface="Ubuntu"/>
+              </a:rPr>
+              <a:t> and analysis in a ‘results’ directory</a:t>
+            </a:r>
+          </a:p>
+          <a:p>
+            <a:pPr algn="l">
+              <a:buFont typeface="Arial" panose="020B0604020202020204" pitchFamily="34" charset="0"/>
+              <a:buChar char="•"/>
+            </a:pPr>
+            <a:r>
+              <a:rPr lang="en-GB" b="0" i="0" dirty="0">
+                <a:solidFill>
+                  <a:srgbClr val="333333"/>
+                </a:solidFill>
+                <a:effectLst/>
+                <a:latin typeface="Ubuntu"/>
+              </a:rPr>
+              <a:t>Put project source code in the ‘</a:t>
+            </a:r>
+            <a:r>
+              <a:rPr lang="en-GB" b="0" i="0" dirty="0" err="1">
+                <a:solidFill>
+                  <a:srgbClr val="333333"/>
+                </a:solidFill>
+                <a:effectLst/>
+                <a:latin typeface="Ubuntu"/>
+              </a:rPr>
+              <a:t>src</a:t>
+            </a:r>
+            <a:r>
+              <a:rPr lang="en-GB" b="0" i="0" dirty="0">
+                <a:solidFill>
+                  <a:srgbClr val="333333"/>
+                </a:solidFill>
+                <a:effectLst/>
+                <a:latin typeface="Ubuntu"/>
+              </a:rPr>
+              <a:t>’ directory</a:t>
+            </a:r>
+          </a:p>
+          <a:p>
+            <a:pPr algn="l">
+              <a:buFont typeface="Arial" panose="020B0604020202020204" pitchFamily="34" charset="0"/>
+              <a:buChar char="•"/>
+            </a:pPr>
+            <a:r>
+              <a:rPr lang="en-GB" b="0" i="0" dirty="0">
+                <a:solidFill>
+                  <a:srgbClr val="333333"/>
+                </a:solidFill>
+                <a:effectLst/>
+                <a:latin typeface="Ubuntu"/>
+              </a:rPr>
+              <a:t>Put compiled programs in the ‘bin’ directory</a:t>
+            </a:r>
+          </a:p>
+          <a:p>
+            <a:pPr algn="l">
+              <a:buFont typeface="Arial" panose="020B0604020202020204" pitchFamily="34" charset="0"/>
+              <a:buChar char="•"/>
+            </a:pPr>
+            <a:r>
+              <a:rPr lang="en-GB" b="0" i="0" dirty="0">
+                <a:solidFill>
+                  <a:srgbClr val="333333"/>
+                </a:solidFill>
+                <a:effectLst/>
+                <a:latin typeface="Ubuntu"/>
+              </a:rPr>
+              <a:t>Name all files to reflect their content or function: use names such as ‘bird_count_table.csv’, ‘notebook.md’, or ‘summarized_results.csv’.</a:t>
+            </a:r>
+          </a:p>
+          <a:p>
+            <a:pPr algn="l">
+              <a:buFont typeface="Arial" panose="020B0604020202020204" pitchFamily="34" charset="0"/>
+              <a:buChar char="•"/>
+            </a:pPr>
+            <a:r>
+              <a:rPr lang="en-GB" b="0" i="0" dirty="0">
+                <a:solidFill>
+                  <a:srgbClr val="333333"/>
+                </a:solidFill>
+                <a:effectLst/>
+                <a:latin typeface="Ubuntu"/>
+              </a:rPr>
+              <a:t>Do not use sequential numbers (e.g., result1.csv, result2.csv) or a location in a final manuscript (e.g., fig_3_a.png), since those numbers will almost certainly change as the project evolves.</a:t>
+            </a:r>
+          </a:p>
+          <a:p>
+            <a:pPr algn="l">
+              <a:buFont typeface="Arial" panose="020B0604020202020204" pitchFamily="34" charset="0"/>
+              <a:buChar char="•"/>
+            </a:pPr>
             <a:endParaRPr lang="en-GB" b="0" i="0" dirty="0">
               <a:solidFill>
                 <a:srgbClr val="333333"/>
@@ -1430,7 +1609,10 @@
             </a:endParaRPr>
           </a:p>
           <a:p>
-            <a:pPr algn="l"/>
+            <a:pPr algn="l">
+              <a:buFont typeface="Arial" panose="020B0604020202020204" pitchFamily="34" charset="0"/>
+              <a:buChar char="•"/>
+            </a:pPr>
             <a:r>
               <a:rPr lang="en-GB" b="0" i="0" dirty="0">
                 <a:solidFill>
@@ -1439,8 +1621,136 @@
                 <a:effectLst/>
                 <a:latin typeface="Ubuntu"/>
               </a:rPr>
-              <a:t>If you change the strategy document it in PROJECT_STRUCTURE (or README) stating why you made the change and when. Update the locations and names of files which followed the old convention</a:t>
-            </a:r>
+              <a:t>The b) structure is called “Organized by analysis” or “by figure”</a:t>
+            </a:r>
+          </a:p>
+          <a:p>
+            <a:pPr algn="l">
+              <a:buFont typeface="Arial" panose="020B0604020202020204" pitchFamily="34" charset="0"/>
+              <a:buChar char="•"/>
+            </a:pPr>
+            <a:endParaRPr lang="en-GB" b="0" i="0" dirty="0">
+              <a:solidFill>
+                <a:srgbClr val="333333"/>
+              </a:solidFill>
+              <a:effectLst/>
+              <a:latin typeface="Ubuntu"/>
+            </a:endParaRPr>
+          </a:p>
+          <a:p>
+            <a:pPr algn="l">
+              <a:buFont typeface="Arial" panose="020B0604020202020204" pitchFamily="34" charset="0"/>
+              <a:buChar char="•"/>
+            </a:pPr>
+            <a:r>
+              <a:rPr lang="en-GB" b="0" i="0" dirty="0">
+                <a:solidFill>
+                  <a:srgbClr val="333333"/>
+                </a:solidFill>
+                <a:effectLst/>
+                <a:latin typeface="Ubuntu"/>
+              </a:rPr>
+              <a:t>The structure similar to c) is recommended for Brain Imaging Data Structure </a:t>
+            </a:r>
+            <a:r>
+              <a:rPr lang="en-GB" b="0" i="0" u="none" strike="noStrike" dirty="0">
+                <a:solidFill>
+                  <a:srgbClr val="196EBD"/>
+                </a:solidFill>
+                <a:effectLst/>
+                <a:latin typeface="Ubuntu"/>
+                <a:hlinkClick r:id="rId4"/>
+              </a:rPr>
+              <a:t>BIDS</a:t>
+            </a:r>
+            <a:r>
+              <a:rPr lang="en-GB" b="0" i="0" dirty="0">
+                <a:solidFill>
+                  <a:srgbClr val="333333"/>
+                </a:solidFill>
+                <a:effectLst/>
+                <a:latin typeface="Ubuntu"/>
+              </a:rPr>
+              <a:t>, as it is organized by patient and type of scans</a:t>
+            </a:r>
+          </a:p>
+          <a:p>
+            <a:pPr marL="0" marR="0" lvl="0" indent="0" algn="l" defTabSz="914400" rtl="0" eaLnBrk="1" fontAlgn="auto" latinLnBrk="0" hangingPunct="1">
+              <a:lnSpc>
+                <a:spcPct val="100000"/>
+              </a:lnSpc>
+              <a:spcBef>
+                <a:spcPts val="0"/>
+              </a:spcBef>
+              <a:spcAft>
+                <a:spcPts val="0"/>
+              </a:spcAft>
+              <a:buClrTx/>
+              <a:buSzTx/>
+              <a:buFont typeface="Arial" panose="020B0604020202020204" pitchFamily="34" charset="0"/>
+              <a:buChar char="•"/>
+              <a:tabLst/>
+              <a:defRPr/>
+            </a:pPr>
+            <a:endParaRPr lang="en-GB" b="0" i="0">
+              <a:solidFill>
+                <a:srgbClr val="333333"/>
+              </a:solidFill>
+              <a:effectLst/>
+              <a:latin typeface="Ubuntu"/>
+            </a:endParaRPr>
+          </a:p>
+          <a:p>
+            <a:pPr marL="0" marR="0" lvl="0" indent="0" algn="l" defTabSz="914400" rtl="0" eaLnBrk="1" fontAlgn="auto" latinLnBrk="0" hangingPunct="1">
+              <a:lnSpc>
+                <a:spcPct val="100000"/>
+              </a:lnSpc>
+              <a:spcBef>
+                <a:spcPts val="0"/>
+              </a:spcBef>
+              <a:spcAft>
+                <a:spcPts val="0"/>
+              </a:spcAft>
+              <a:buClrTx/>
+              <a:buSzTx/>
+              <a:buFont typeface="Arial" panose="020B0604020202020204" pitchFamily="34" charset="0"/>
+              <a:buChar char="•"/>
+              <a:tabLst/>
+              <a:defRPr/>
+            </a:pPr>
+            <a:r>
+              <a:rPr lang="en-GB" b="0" i="0">
+                <a:solidFill>
+                  <a:srgbClr val="333333"/>
+                </a:solidFill>
+                <a:effectLst/>
+                <a:latin typeface="Ubuntu"/>
+              </a:rPr>
+              <a:t>d</a:t>
+            </a:r>
+            <a:r>
+              <a:rPr lang="en-GB" b="0" i="0" dirty="0">
+                <a:solidFill>
+                  <a:srgbClr val="333333"/>
+                </a:solidFill>
+                <a:effectLst/>
+                <a:latin typeface="Ubuntu"/>
+              </a:rPr>
+              <a:t>) is useful when we are interested in outcomes of drug treatments</a:t>
+            </a:r>
+          </a:p>
+          <a:p>
+            <a:pPr algn="l">
+              <a:buFont typeface="Arial" panose="020B0604020202020204" pitchFamily="34" charset="0"/>
+              <a:buNone/>
+            </a:pPr>
+            <a:endParaRPr lang="en-GB" b="0" i="0" dirty="0">
+              <a:solidFill>
+                <a:srgbClr val="333333"/>
+              </a:solidFill>
+              <a:effectLst/>
+              <a:latin typeface="Ubuntu"/>
+            </a:endParaRPr>
           </a:p>
           <a:p>
             <a:endParaRPr lang="en-GB" dirty="0"/>
@@ -1464,7 +1774,7 @@
           <a:p>
             <a:fld id="{B361C124-7373-F149-A166-BB8240B9FE77}" type="slidenum">
               <a:rPr lang="en-GB" smtClean="0"/>
-              <a:t>20</a:t>
+              <a:t>21</a:t>
             </a:fld>
             <a:endParaRPr lang="en-GB"/>
           </a:p>
@@ -1473,7 +1783,7 @@
     </p:spTree>
     <p:extLst>
       <p:ext uri="{BB962C8B-B14F-4D97-AF65-F5344CB8AC3E}">
-        <p14:creationId xmlns:p14="http://schemas.microsoft.com/office/powerpoint/2010/main" val="893431622"/>
+        <p14:creationId xmlns:p14="http://schemas.microsoft.com/office/powerpoint/2010/main" val="1689098888"/>
       </p:ext>
     </p:extLst>
   </p:cSld>
@@ -1536,19 +1846,24 @@
                 <a:effectLst/>
                 <a:latin typeface="Ubuntu"/>
               </a:rPr>
-              <a:t>The </a:t>
-            </a:r>
-            <a:r>
-              <a:rPr lang="en-GB" b="0" i="0" u="none" strike="noStrike" dirty="0">
-                <a:solidFill>
-                  <a:srgbClr val="196EBD"/>
+              <a:t>Do you know how and where to keep 3 copies of your data which are always up to date?</a:t>
+            </a:r>
+          </a:p>
+          <a:p>
+            <a:pPr algn="l"/>
+            <a:r>
+              <a:rPr lang="en-GB" b="0" i="0" dirty="0">
+                <a:solidFill>
+                  <a:srgbClr val="333333"/>
                 </a:solidFill>
                 <a:effectLst/>
                 <a:latin typeface="Ubuntu"/>
-                <a:hlinkClick r:id="rId3"/>
-              </a:rPr>
-              <a:t>Good enough practices in scientific computing</a:t>
-            </a:r>
+              </a:rPr>
+              <a:t>Secure data preservation is very difficult to achieve without institutional support and know-how. One option is cloud storage, but not all data may be put in a public cloud.</a:t>
+            </a:r>
+          </a:p>
+          <a:p>
+            <a:pPr algn="l"/>
             <a:r>
               <a:rPr lang="en-GB" b="0" i="0" dirty="0">
                 <a:solidFill>
@@ -1557,333 +1872,8 @@
                 <a:effectLst/>
                 <a:latin typeface="Ubuntu"/>
               </a:rPr>
-              <a:t> paper makes the following simple recommendations:</a:t>
-            </a:r>
-          </a:p>
-          <a:p>
-            <a:pPr algn="l">
-              <a:buFont typeface="Arial" panose="020B0604020202020204" pitchFamily="34" charset="0"/>
-              <a:buChar char="•"/>
-            </a:pPr>
-            <a:r>
-              <a:rPr lang="en-GB" b="0" i="0" dirty="0">
-                <a:solidFill>
-                  <a:srgbClr val="333333"/>
-                </a:solidFill>
-                <a:effectLst/>
-                <a:latin typeface="Ubuntu"/>
-              </a:rPr>
-              <a:t>Put each project in its own directory, which is named after the project</a:t>
-            </a:r>
-          </a:p>
-          <a:p>
-            <a:pPr algn="l">
-              <a:buFont typeface="Arial" panose="020B0604020202020204" pitchFamily="34" charset="0"/>
-              <a:buChar char="•"/>
-            </a:pPr>
-            <a:r>
-              <a:rPr lang="en-GB" b="0" i="0" dirty="0">
-                <a:solidFill>
-                  <a:srgbClr val="333333"/>
-                </a:solidFill>
-                <a:effectLst/>
-                <a:latin typeface="Ubuntu"/>
-              </a:rPr>
-              <a:t>Put text documents associated with the project in the ‘doc’ directory</a:t>
-            </a:r>
-          </a:p>
-          <a:p>
-            <a:pPr algn="l">
-              <a:buFont typeface="Arial" panose="020B0604020202020204" pitchFamily="34" charset="0"/>
-              <a:buChar char="•"/>
-            </a:pPr>
-            <a:r>
-              <a:rPr lang="en-GB" b="0" i="0" dirty="0">
-                <a:solidFill>
-                  <a:srgbClr val="333333"/>
-                </a:solidFill>
-                <a:effectLst/>
-                <a:latin typeface="Ubuntu"/>
-              </a:rPr>
-              <a:t>Put raw data and metadata in a ‘data’ directory</a:t>
-            </a:r>
-          </a:p>
-          <a:p>
-            <a:pPr algn="l">
-              <a:buFont typeface="Arial" panose="020B0604020202020204" pitchFamily="34" charset="0"/>
-              <a:buChar char="•"/>
-            </a:pPr>
-            <a:r>
-              <a:rPr lang="en-GB" b="0" i="0" dirty="0">
-                <a:solidFill>
-                  <a:srgbClr val="333333"/>
-                </a:solidFill>
-                <a:effectLst/>
-                <a:latin typeface="Ubuntu"/>
-              </a:rPr>
-              <a:t>Put files generated during </a:t>
-            </a:r>
-            <a:r>
-              <a:rPr lang="en-GB" b="0" i="0" dirty="0" err="1">
-                <a:solidFill>
-                  <a:srgbClr val="333333"/>
-                </a:solidFill>
-                <a:effectLst/>
-                <a:latin typeface="Ubuntu"/>
-              </a:rPr>
-              <a:t>cleanup</a:t>
-            </a:r>
-            <a:r>
-              <a:rPr lang="en-GB" b="0" i="0" dirty="0">
-                <a:solidFill>
-                  <a:srgbClr val="333333"/>
-                </a:solidFill>
-                <a:effectLst/>
-                <a:latin typeface="Ubuntu"/>
-              </a:rPr>
-              <a:t> and analysis in a ‘results’ directory</a:t>
-            </a:r>
-          </a:p>
-          <a:p>
-            <a:pPr algn="l">
-              <a:buFont typeface="Arial" panose="020B0604020202020204" pitchFamily="34" charset="0"/>
-              <a:buChar char="•"/>
-            </a:pPr>
-            <a:r>
-              <a:rPr lang="en-GB" b="0" i="0" dirty="0">
-                <a:solidFill>
-                  <a:srgbClr val="333333"/>
-                </a:solidFill>
-                <a:effectLst/>
-                <a:latin typeface="Ubuntu"/>
-              </a:rPr>
-              <a:t>Put project source code in the ‘</a:t>
-            </a:r>
-            <a:r>
-              <a:rPr lang="en-GB" b="0" i="0" dirty="0" err="1">
-                <a:solidFill>
-                  <a:srgbClr val="333333"/>
-                </a:solidFill>
-                <a:effectLst/>
-                <a:latin typeface="Ubuntu"/>
-              </a:rPr>
-              <a:t>src</a:t>
-            </a:r>
-            <a:r>
-              <a:rPr lang="en-GB" b="0" i="0" dirty="0">
-                <a:solidFill>
-                  <a:srgbClr val="333333"/>
-                </a:solidFill>
-                <a:effectLst/>
-                <a:latin typeface="Ubuntu"/>
-              </a:rPr>
-              <a:t>’ directory</a:t>
-            </a:r>
-          </a:p>
-          <a:p>
-            <a:pPr algn="l">
-              <a:buFont typeface="Arial" panose="020B0604020202020204" pitchFamily="34" charset="0"/>
-              <a:buChar char="•"/>
-            </a:pPr>
-            <a:r>
-              <a:rPr lang="en-GB" b="0" i="0" dirty="0">
-                <a:solidFill>
-                  <a:srgbClr val="333333"/>
-                </a:solidFill>
-                <a:effectLst/>
-                <a:latin typeface="Ubuntu"/>
-              </a:rPr>
-              <a:t>Put compiled programs in the ‘bin’ directory</a:t>
-            </a:r>
-          </a:p>
-          <a:p>
-            <a:pPr algn="l">
-              <a:buFont typeface="Arial" panose="020B0604020202020204" pitchFamily="34" charset="0"/>
-              <a:buChar char="•"/>
-            </a:pPr>
-            <a:r>
-              <a:rPr lang="en-GB" b="0" i="0" dirty="0">
-                <a:solidFill>
-                  <a:srgbClr val="333333"/>
-                </a:solidFill>
-                <a:effectLst/>
-                <a:latin typeface="Ubuntu"/>
-              </a:rPr>
-              <a:t>Name all files to reflect their content or function: use names such as ‘bird_count_table.csv’, ‘notebook.md’, or ‘summarized_results.csv’.</a:t>
-            </a:r>
-          </a:p>
-          <a:p>
-            <a:pPr algn="l">
-              <a:buFont typeface="Arial" panose="020B0604020202020204" pitchFamily="34" charset="0"/>
-              <a:buChar char="•"/>
-            </a:pPr>
-            <a:r>
-              <a:rPr lang="en-GB" b="0" i="0" dirty="0">
-                <a:solidFill>
-                  <a:srgbClr val="333333"/>
-                </a:solidFill>
-                <a:effectLst/>
-                <a:latin typeface="Ubuntu"/>
-              </a:rPr>
-              <a:t>Do not use sequential numbers (e.g., result1.csv, result2.csv) or a location in a final manuscript (e.g., fig_3_a.png), since those numbers will almost certainly change as the project evolves.</a:t>
-            </a:r>
-          </a:p>
-          <a:p>
-            <a:pPr algn="l">
-              <a:buFont typeface="Arial" panose="020B0604020202020204" pitchFamily="34" charset="0"/>
-              <a:buChar char="•"/>
-            </a:pPr>
-            <a:endParaRPr lang="en-GB" b="0" i="0" dirty="0">
-              <a:solidFill>
-                <a:srgbClr val="333333"/>
-              </a:solidFill>
-              <a:effectLst/>
-              <a:latin typeface="Ubuntu"/>
-            </a:endParaRPr>
-          </a:p>
-          <a:p>
-            <a:pPr algn="l">
-              <a:buFont typeface="Arial" panose="020B0604020202020204" pitchFamily="34" charset="0"/>
-              <a:buChar char="•"/>
-            </a:pPr>
-            <a:r>
-              <a:rPr lang="en-GB" b="0" i="0" dirty="0">
-                <a:solidFill>
-                  <a:srgbClr val="333333"/>
-                </a:solidFill>
-                <a:effectLst/>
-                <a:latin typeface="Ubuntu"/>
-              </a:rPr>
-              <a:t>The b) structure is called “Organized by analysis” or “by figure”</a:t>
-            </a:r>
-          </a:p>
-          <a:p>
-            <a:pPr algn="l">
-              <a:buFont typeface="Arial" panose="020B0604020202020204" pitchFamily="34" charset="0"/>
-              <a:buChar char="•"/>
-            </a:pPr>
-            <a:endParaRPr lang="en-GB" b="0" i="0" dirty="0">
-              <a:solidFill>
-                <a:srgbClr val="333333"/>
-              </a:solidFill>
-              <a:effectLst/>
-              <a:latin typeface="Ubuntu"/>
-            </a:endParaRPr>
-          </a:p>
-          <a:p>
-            <a:pPr algn="l">
-              <a:buFont typeface="Arial" panose="020B0604020202020204" pitchFamily="34" charset="0"/>
-              <a:buChar char="•"/>
-            </a:pPr>
-            <a:r>
-              <a:rPr lang="en-GB" b="0" i="0" dirty="0">
-                <a:solidFill>
-                  <a:srgbClr val="333333"/>
-                </a:solidFill>
-                <a:effectLst/>
-                <a:latin typeface="Ubuntu"/>
-              </a:rPr>
-              <a:t>The structure similar to c) is recommended for Brain Imaging Data Structure </a:t>
-            </a:r>
-            <a:r>
-              <a:rPr lang="en-GB" b="0" i="0" u="none" strike="noStrike" dirty="0">
-                <a:solidFill>
-                  <a:srgbClr val="196EBD"/>
-                </a:solidFill>
-                <a:effectLst/>
-                <a:latin typeface="Ubuntu"/>
-                <a:hlinkClick r:id="rId4"/>
-              </a:rPr>
-              <a:t>BIDS</a:t>
-            </a:r>
-            <a:r>
-              <a:rPr lang="en-GB" b="0" i="0" dirty="0">
-                <a:solidFill>
-                  <a:srgbClr val="333333"/>
-                </a:solidFill>
-                <a:effectLst/>
-                <a:latin typeface="Ubuntu"/>
-              </a:rPr>
-              <a:t>, as it is organized by patient and type of scans</a:t>
-            </a:r>
-          </a:p>
-          <a:p>
-            <a:pPr marL="0" marR="0" lvl="0" indent="0" algn="l" defTabSz="914400" rtl="0" eaLnBrk="1" fontAlgn="auto" latinLnBrk="0" hangingPunct="1">
-              <a:lnSpc>
-                <a:spcPct val="100000"/>
-              </a:lnSpc>
-              <a:spcBef>
-                <a:spcPts val="0"/>
-              </a:spcBef>
-              <a:spcAft>
-                <a:spcPts val="0"/>
-              </a:spcAft>
-              <a:buClrTx/>
-              <a:buSzTx/>
-              <a:buFont typeface="Arial" panose="020B0604020202020204" pitchFamily="34" charset="0"/>
-              <a:buChar char="•"/>
-              <a:tabLst/>
-              <a:defRPr/>
-            </a:pPr>
-            <a:endParaRPr lang="en-GB" b="0" i="0">
-              <a:solidFill>
-                <a:srgbClr val="333333"/>
-              </a:solidFill>
-              <a:effectLst/>
-              <a:latin typeface="Ubuntu"/>
-            </a:endParaRPr>
-          </a:p>
-          <a:p>
-            <a:pPr marL="0" marR="0" lvl="0" indent="0" algn="l" defTabSz="914400" rtl="0" eaLnBrk="1" fontAlgn="auto" latinLnBrk="0" hangingPunct="1">
-              <a:lnSpc>
-                <a:spcPct val="100000"/>
-              </a:lnSpc>
-              <a:spcBef>
-                <a:spcPts val="0"/>
-              </a:spcBef>
-              <a:spcAft>
-                <a:spcPts val="0"/>
-              </a:spcAft>
-              <a:buClrTx/>
-              <a:buSzTx/>
-              <a:buFont typeface="Arial" panose="020B0604020202020204" pitchFamily="34" charset="0"/>
-              <a:buChar char="•"/>
-              <a:tabLst/>
-              <a:defRPr/>
-            </a:pPr>
-            <a:r>
-              <a:rPr lang="en-GB" b="0" i="0">
-                <a:solidFill>
-                  <a:srgbClr val="333333"/>
-                </a:solidFill>
-                <a:effectLst/>
-                <a:latin typeface="Ubuntu"/>
-              </a:rPr>
-              <a:t>d</a:t>
-            </a:r>
-            <a:r>
-              <a:rPr lang="en-GB" b="0" i="0" dirty="0">
-                <a:solidFill>
-                  <a:srgbClr val="333333"/>
-                </a:solidFill>
-                <a:effectLst/>
-                <a:latin typeface="Ubuntu"/>
-              </a:rPr>
-              <a:t>) is useful when we are interested in outcomes of drug treatments</a:t>
-            </a:r>
-          </a:p>
-          <a:p>
-            <a:pPr algn="l">
-              <a:buFont typeface="Arial" panose="020B0604020202020204" pitchFamily="34" charset="0"/>
-              <a:buNone/>
-            </a:pPr>
-            <a:endParaRPr lang="en-GB" b="0" i="0" dirty="0">
-              <a:solidFill>
-                <a:srgbClr val="333333"/>
-              </a:solidFill>
-              <a:effectLst/>
-              <a:latin typeface="Ubuntu"/>
-            </a:endParaRPr>
+              <a:t>You should always check your institutional guidelines and what solutions are available in your organisation.</a:t>
+            </a:r>
           </a:p>
           <a:p>
             <a:endParaRPr lang="en-GB" dirty="0"/>
@@ -1916,7 +1906,7 @@
     </p:spTree>
     <p:extLst>
       <p:ext uri="{BB962C8B-B14F-4D97-AF65-F5344CB8AC3E}">
-        <p14:creationId xmlns:p14="http://schemas.microsoft.com/office/powerpoint/2010/main" val="1689098888"/>
+        <p14:creationId xmlns:p14="http://schemas.microsoft.com/office/powerpoint/2010/main" val="2908121329"/>
       </p:ext>
     </p:extLst>
   </p:cSld>
@@ -1970,129 +1960,6 @@
           <a:bodyPr/>
           <a:lstStyle/>
           <a:p>
-            <a:pPr algn="l"/>
-            <a:r>
-              <a:rPr lang="en-GB" b="0" i="0" dirty="0">
-                <a:solidFill>
-                  <a:srgbClr val="333333"/>
-                </a:solidFill>
-                <a:effectLst/>
-                <a:latin typeface="Ubuntu"/>
-              </a:rPr>
-              <a:t>Do you know how and where to keep 3 copies of your data which are always up to date?</a:t>
-            </a:r>
-          </a:p>
-          <a:p>
-            <a:pPr algn="l"/>
-            <a:r>
-              <a:rPr lang="en-GB" b="0" i="0" dirty="0">
-                <a:solidFill>
-                  <a:srgbClr val="333333"/>
-                </a:solidFill>
-                <a:effectLst/>
-                <a:latin typeface="Ubuntu"/>
-              </a:rPr>
-              <a:t>Secure data preservation is very difficult to achieve without institutional support and know-how. One option is cloud storage, but not all data may be put in a public cloud.</a:t>
-            </a:r>
-          </a:p>
-          <a:p>
-            <a:pPr algn="l"/>
-            <a:r>
-              <a:rPr lang="en-GB" b="0" i="0" dirty="0">
-                <a:solidFill>
-                  <a:srgbClr val="333333"/>
-                </a:solidFill>
-                <a:effectLst/>
-                <a:latin typeface="Ubuntu"/>
-              </a:rPr>
-              <a:t>You should always check your institutional guidelines and what solutions are available in your organisation.</a:t>
-            </a:r>
-          </a:p>
-          <a:p>
-            <a:endParaRPr lang="en-GB" dirty="0"/>
-          </a:p>
-        </p:txBody>
-      </p:sp>
-      <p:sp>
-        <p:nvSpPr>
-          <p:cNvPr id="4" name="Slide Number Placeholder 3"/>
-          <p:cNvSpPr>
-            <a:spLocks noGrp="1"/>
-          </p:cNvSpPr>
-          <p:nvPr>
-            <p:ph type="sldNum" sz="quarter" idx="5"/>
-          </p:nvPr>
-        </p:nvSpPr>
-        <p:spPr/>
-        <p:txBody>
-          <a:bodyPr/>
-          <a:lstStyle/>
-          <a:p>
-            <a:fld id="{B361C124-7373-F149-A166-BB8240B9FE77}" type="slidenum">
-              <a:rPr lang="en-GB" smtClean="0"/>
-              <a:t>23</a:t>
-            </a:fld>
-            <a:endParaRPr lang="en-GB"/>
-          </a:p>
-        </p:txBody>
-      </p:sp>
-    </p:spTree>
-    <p:extLst>
-      <p:ext uri="{BB962C8B-B14F-4D97-AF65-F5344CB8AC3E}">
-        <p14:creationId xmlns:p14="http://schemas.microsoft.com/office/powerpoint/2010/main" val="2908121329"/>
-      </p:ext>
-    </p:extLst>
-  </p:cSld>
-  <p:clrMapOvr>
-    <a:masterClrMapping/>
-  </p:clrMapOvr>
-</p:notes>
-</file>
-
-<file path=ppt/notesSlides/notesSlide9.xml><?xml version="1.0" encoding="utf-8"?>
-<p:notes xmlns:a="http://schemas.openxmlformats.org/drawingml/2006/main" xmlns:r="http://schemas.openxmlformats.org/officeDocument/2006/relationships" xmlns:p="http://schemas.openxmlformats.org/presentationml/2006/main">
-  <p:cSld>
-    <p:spTree>
-      <p:nvGrpSpPr>
-        <p:cNvPr id="1" name=""/>
-        <p:cNvGrpSpPr/>
-        <p:nvPr/>
-      </p:nvGrpSpPr>
-      <p:grpSpPr>
-        <a:xfrm>
-          <a:off x="0" y="0"/>
-          <a:ext cx="0" cy="0"/>
-          <a:chOff x="0" y="0"/>
-          <a:chExt cx="0" cy="0"/>
-        </a:xfrm>
-      </p:grpSpPr>
-      <p:sp>
-        <p:nvSpPr>
-          <p:cNvPr id="2" name="Slide Image Placeholder 1"/>
-          <p:cNvSpPr>
-            <a:spLocks noGrp="1" noRot="1" noChangeAspect="1"/>
-          </p:cNvSpPr>
-          <p:nvPr>
-            <p:ph type="sldImg"/>
-          </p:nvPr>
-        </p:nvSpPr>
-        <p:spPr/>
-      </p:sp>
-      <p:sp>
-        <p:nvSpPr>
-          <p:cNvPr id="3" name="Notes Placeholder 2"/>
-          <p:cNvSpPr>
-            <a:spLocks noGrp="1"/>
-          </p:cNvSpPr>
-          <p:nvPr>
-            <p:ph type="body" idx="1"/>
-          </p:nvPr>
-        </p:nvSpPr>
-        <p:spPr/>
-        <p:txBody>
-          <a:bodyPr/>
-          <a:lstStyle/>
-          <a:p>
             <a:r>
               <a:rPr lang="en-GB" b="0" i="0" dirty="0">
                 <a:solidFill>
@@ -2185,7 +2052,7 @@
           <a:p>
             <a:fld id="{B361C124-7373-F149-A166-BB8240B9FE77}" type="slidenum">
               <a:rPr lang="en-GB" smtClean="0"/>
-              <a:t>25</a:t>
+              <a:t>24</a:t>
             </a:fld>
             <a:endParaRPr lang="en-GB"/>
           </a:p>
@@ -2353,7 +2220,7 @@
           <a:p>
             <a:fld id="{5913FB77-D8DB-4AB9-8EA5-EE8C3B57A5E1}" type="datetimeFigureOut">
               <a:rPr lang="en-GB" smtClean="0"/>
-              <a:t>21/03/2024</a:t>
+              <a:t>22/03/2024</a:t>
             </a:fld>
             <a:endParaRPr lang="en-GB"/>
           </a:p>
@@ -2600,7 +2467,7 @@
           <a:p>
             <a:fld id="{5913FB77-D8DB-4AB9-8EA5-EE8C3B57A5E1}" type="datetimeFigureOut">
               <a:rPr lang="en-GB" smtClean="0"/>
-              <a:t>21/03/2024</a:t>
+              <a:t>22/03/2024</a:t>
             </a:fld>
             <a:endParaRPr lang="en-GB"/>
           </a:p>
@@ -2810,7 +2677,7 @@
           <a:p>
             <a:fld id="{5913FB77-D8DB-4AB9-8EA5-EE8C3B57A5E1}" type="datetimeFigureOut">
               <a:rPr lang="en-GB" smtClean="0"/>
-              <a:t>21/03/2024</a:t>
+              <a:t>22/03/2024</a:t>
             </a:fld>
             <a:endParaRPr lang="en-GB"/>
           </a:p>
@@ -3010,7 +2877,7 @@
           <a:p>
             <a:fld id="{5913FB77-D8DB-4AB9-8EA5-EE8C3B57A5E1}" type="datetimeFigureOut">
               <a:rPr lang="en-GB" smtClean="0"/>
-              <a:t>21/03/2024</a:t>
+              <a:t>22/03/2024</a:t>
             </a:fld>
             <a:endParaRPr lang="en-GB"/>
           </a:p>
@@ -3286,7 +3153,7 @@
           <a:p>
             <a:fld id="{5913FB77-D8DB-4AB9-8EA5-EE8C3B57A5E1}" type="datetimeFigureOut">
               <a:rPr lang="en-GB" smtClean="0"/>
-              <a:t>21/03/2024</a:t>
+              <a:t>22/03/2024</a:t>
             </a:fld>
             <a:endParaRPr lang="en-GB"/>
           </a:p>
@@ -3554,7 +3421,7 @@
           <a:p>
             <a:fld id="{5913FB77-D8DB-4AB9-8EA5-EE8C3B57A5E1}" type="datetimeFigureOut">
               <a:rPr lang="en-GB" smtClean="0"/>
-              <a:t>21/03/2024</a:t>
+              <a:t>22/03/2024</a:t>
             </a:fld>
             <a:endParaRPr lang="en-GB"/>
           </a:p>
@@ -3969,7 +3836,7 @@
           <a:p>
             <a:fld id="{5913FB77-D8DB-4AB9-8EA5-EE8C3B57A5E1}" type="datetimeFigureOut">
               <a:rPr lang="en-GB" smtClean="0"/>
-              <a:t>21/03/2024</a:t>
+              <a:t>22/03/2024</a:t>
             </a:fld>
             <a:endParaRPr lang="en-GB"/>
           </a:p>
@@ -4111,7 +3978,7 @@
           <a:p>
             <a:fld id="{5913FB77-D8DB-4AB9-8EA5-EE8C3B57A5E1}" type="datetimeFigureOut">
               <a:rPr lang="en-GB" smtClean="0"/>
-              <a:t>21/03/2024</a:t>
+              <a:t>22/03/2024</a:t>
             </a:fld>
             <a:endParaRPr lang="en-GB"/>
           </a:p>
@@ -4224,7 +4091,7 @@
           <a:p>
             <a:fld id="{5913FB77-D8DB-4AB9-8EA5-EE8C3B57A5E1}" type="datetimeFigureOut">
               <a:rPr lang="en-GB" smtClean="0"/>
-              <a:t>21/03/2024</a:t>
+              <a:t>22/03/2024</a:t>
             </a:fld>
             <a:endParaRPr lang="en-GB"/>
           </a:p>
@@ -4537,7 +4404,7 @@
           <a:p>
             <a:fld id="{5913FB77-D8DB-4AB9-8EA5-EE8C3B57A5E1}" type="datetimeFigureOut">
               <a:rPr lang="en-GB" smtClean="0"/>
-              <a:t>21/03/2024</a:t>
+              <a:t>22/03/2024</a:t>
             </a:fld>
             <a:endParaRPr lang="en-GB"/>
           </a:p>
@@ -4826,7 +4693,7 @@
           <a:p>
             <a:fld id="{5913FB77-D8DB-4AB9-8EA5-EE8C3B57A5E1}" type="datetimeFigureOut">
               <a:rPr lang="en-GB" smtClean="0"/>
-              <a:t>21/03/2024</a:t>
+              <a:t>22/03/2024</a:t>
             </a:fld>
             <a:endParaRPr lang="en-GB"/>
           </a:p>
@@ -5068,7 +4935,7 @@
             <a:fld id="{5913FB77-D8DB-4AB9-8EA5-EE8C3B57A5E1}" type="datetimeFigureOut">
               <a:rPr lang="en-GB" smtClean="0"/>
               <a:pPr/>
-              <a:t>21/03/2024</a:t>
+              <a:t>22/03/2024</a:t>
             </a:fld>
             <a:endParaRPr lang="en-GB"/>
           </a:p>
@@ -6880,12 +6747,104 @@
           <a:chExt cx="0" cy="0"/>
         </a:xfrm>
       </p:grpSpPr>
+      <p:sp>
+        <p:nvSpPr>
+          <p:cNvPr id="5" name="TextBox 4">
+            <a:extLst>
+              <a:ext uri="{FF2B5EF4-FFF2-40B4-BE49-F238E27FC236}">
+                <a16:creationId xmlns:a16="http://schemas.microsoft.com/office/drawing/2014/main" id="{3A7A1F5C-9C70-4DE3-BA39-7835B2935EB3}"/>
+              </a:ext>
+            </a:extLst>
+          </p:cNvPr>
+          <p:cNvSpPr txBox="1"/>
+          <p:nvPr/>
+        </p:nvSpPr>
+        <p:spPr>
+          <a:xfrm>
+            <a:off x="847780" y="1379400"/>
+            <a:ext cx="9751569" cy="2246769"/>
+          </a:xfrm>
+          <a:prstGeom prst="rect">
+            <a:avLst/>
+          </a:prstGeom>
+          <a:noFill/>
+        </p:spPr>
+        <p:txBody>
+          <a:bodyPr wrap="square">
+            <a:spAutoFit/>
+          </a:bodyPr>
+          <a:lstStyle/>
+          <a:p>
+            <a:pPr algn="just"/>
+            <a:endParaRPr lang="en-GB" sz="2800" u="sng" dirty="0">
+              <a:solidFill>
+                <a:srgbClr val="0070C0"/>
+              </a:solidFill>
+            </a:endParaRPr>
+          </a:p>
+          <a:p>
+            <a:pPr marL="457200" indent="-457200">
+              <a:buFont typeface="Arial" panose="020B0604020202020204" pitchFamily="34" charset="0"/>
+              <a:buChar char="•"/>
+            </a:pPr>
+            <a:r>
+              <a:rPr lang="en-GB" sz="2800" dirty="0">
+                <a:solidFill>
+                  <a:srgbClr val="0070C0"/>
+                </a:solidFill>
+              </a:rPr>
+              <a:t>Folders permit grouping relevant data together</a:t>
+            </a:r>
+          </a:p>
+          <a:p>
+            <a:pPr marL="457200" indent="-457200">
+              <a:buFont typeface="Arial" panose="020B0604020202020204" pitchFamily="34" charset="0"/>
+              <a:buChar char="•"/>
+            </a:pPr>
+            <a:endParaRPr lang="en-GB" sz="2800" dirty="0">
+              <a:solidFill>
+                <a:srgbClr val="0070C0"/>
+              </a:solidFill>
+            </a:endParaRPr>
+          </a:p>
+          <a:p>
+            <a:pPr marL="457200" indent="-457200">
+              <a:buFont typeface="Arial" panose="020B0604020202020204" pitchFamily="34" charset="0"/>
+              <a:buChar char="•"/>
+            </a:pPr>
+            <a:r>
+              <a:rPr lang="pl-PL" sz="2800" dirty="0">
+                <a:solidFill>
+                  <a:srgbClr val="0070C0"/>
+                </a:solidFill>
+              </a:rPr>
+              <a:t>Folders help to keep files names short</a:t>
+            </a:r>
+            <a:endParaRPr lang="en-GB" sz="2800" dirty="0">
+              <a:solidFill>
+                <a:srgbClr val="0070C0"/>
+              </a:solidFill>
+            </a:endParaRPr>
+          </a:p>
+          <a:p>
+            <a:pPr marL="457200" indent="-457200">
+              <a:buFont typeface="Arial" panose="020B0604020202020204" pitchFamily="34" charset="0"/>
+              <a:buChar char="•"/>
+            </a:pPr>
+            <a:endParaRPr lang="en-GB" sz="2800" dirty="0">
+              <a:solidFill>
+                <a:srgbClr val="0070C0"/>
+              </a:solidFill>
+            </a:endParaRPr>
+          </a:p>
+        </p:txBody>
+      </p:sp>
       <p:pic>
         <p:nvPicPr>
-          <p:cNvPr id="4" name="Picture 2" descr="Ed_DaSH">
-            <a:extLst>
-              <a:ext uri="{FF2B5EF4-FFF2-40B4-BE49-F238E27FC236}">
-                <a16:creationId xmlns:a16="http://schemas.microsoft.com/office/drawing/2014/main" id="{A783256F-E39E-4712-96B0-240BD611CFEB}"/>
+          <p:cNvPr id="6" name="Picture 2" descr="Ed_DaSH">
+            <a:extLst>
+              <a:ext uri="{FF2B5EF4-FFF2-40B4-BE49-F238E27FC236}">
+                <a16:creationId xmlns:a16="http://schemas.microsoft.com/office/drawing/2014/main" id="{6F3CF586-06D2-46C3-A4A3-130E31C4A16F}"/>
               </a:ext>
             </a:extLst>
           </p:cNvPr>
@@ -6929,10 +6888,10 @@
       </p:pic>
       <p:sp>
         <p:nvSpPr>
-          <p:cNvPr id="6" name="Title 1">
-            <a:extLst>
-              <a:ext uri="{FF2B5EF4-FFF2-40B4-BE49-F238E27FC236}">
-                <a16:creationId xmlns:a16="http://schemas.microsoft.com/office/drawing/2014/main" id="{D06B0E46-2A23-C545-8823-814B73A2BBF8}"/>
+          <p:cNvPr id="7" name="Title 1">
+            <a:extLst>
+              <a:ext uri="{FF2B5EF4-FFF2-40B4-BE49-F238E27FC236}">
+                <a16:creationId xmlns:a16="http://schemas.microsoft.com/office/drawing/2014/main" id="{B8224CED-57FE-204B-B358-FE8934FB9381}"/>
               </a:ext>
             </a:extLst>
           </p:cNvPr>
@@ -6955,160 +6914,15 @@
           <a:p>
             <a:r>
               <a:rPr lang="en-GB" dirty="0"/>
-              <a:t>Exercise 2 - solution</a:t>
-            </a:r>
-          </a:p>
-        </p:txBody>
-      </p:sp>
-      <p:sp>
-        <p:nvSpPr>
-          <p:cNvPr id="7" name="TextBox 6">
-            <a:extLst>
-              <a:ext uri="{FF2B5EF4-FFF2-40B4-BE49-F238E27FC236}">
-                <a16:creationId xmlns:a16="http://schemas.microsoft.com/office/drawing/2014/main" id="{5001408C-7E03-4B59-9ABC-3D776F52B5F2}"/>
-              </a:ext>
-            </a:extLst>
-          </p:cNvPr>
-          <p:cNvSpPr txBox="1"/>
-          <p:nvPr/>
-        </p:nvSpPr>
-        <p:spPr>
-          <a:xfrm>
-            <a:off x="2456728" y="2123705"/>
-            <a:ext cx="6094070" cy="2784737"/>
-          </a:xfrm>
-          <a:prstGeom prst="rect">
-            <a:avLst/>
-          </a:prstGeom>
-          <a:noFill/>
-        </p:spPr>
-        <p:txBody>
-          <a:bodyPr wrap="square">
-            <a:spAutoFit/>
-          </a:bodyPr>
-          <a:lstStyle/>
-          <a:p>
-            <a:pPr algn="l">
-              <a:lnSpc>
-                <a:spcPct val="200000"/>
-              </a:lnSpc>
-            </a:pPr>
-            <a:r>
-              <a:rPr lang="pt-BR" b="0" i="0" dirty="0">
-                <a:solidFill>
-                  <a:srgbClr val="333333"/>
-                </a:solidFill>
-                <a:effectLst/>
-                <a:latin typeface="Ubuntu"/>
-              </a:rPr>
-              <a:t>1b) </a:t>
-            </a:r>
-            <a:r>
-              <a:rPr lang="en-GB" b="0" i="0" dirty="0">
-                <a:solidFill>
-                  <a:srgbClr val="333333"/>
-                </a:solidFill>
-                <a:effectLst/>
-                <a:latin typeface="Ubuntu"/>
-              </a:rPr>
-              <a:t> rna-levels-by-site.v002.xlsx</a:t>
-            </a:r>
-          </a:p>
-          <a:p>
-            <a:pPr algn="l">
-              <a:lnSpc>
-                <a:spcPct val="200000"/>
-              </a:lnSpc>
-            </a:pPr>
-            <a:endParaRPr lang="pt-BR" b="0" i="0" dirty="0">
-              <a:solidFill>
-                <a:srgbClr val="333333"/>
-              </a:solidFill>
-              <a:effectLst/>
-              <a:latin typeface="Ubuntu"/>
-            </a:endParaRPr>
-          </a:p>
-          <a:p>
-            <a:pPr algn="l">
-              <a:lnSpc>
-                <a:spcPct val="200000"/>
-              </a:lnSpc>
-            </a:pPr>
-            <a:r>
-              <a:rPr lang="pt-BR" b="0" i="0" dirty="0">
-                <a:solidFill>
-                  <a:srgbClr val="333333"/>
-                </a:solidFill>
-                <a:effectLst/>
-                <a:latin typeface="Ubuntu"/>
-              </a:rPr>
-              <a:t>2a) </a:t>
-            </a:r>
-            <a:r>
-              <a:rPr lang="en-GB" b="0" i="0" dirty="0">
-                <a:solidFill>
-                  <a:srgbClr val="333333"/>
-                </a:solidFill>
-                <a:effectLst/>
-                <a:latin typeface="Ubuntu"/>
-              </a:rPr>
-              <a:t>20210906-birds-count-EDI.csv</a:t>
-            </a:r>
-          </a:p>
-          <a:p>
-            <a:pPr algn="l">
-              <a:lnSpc>
-                <a:spcPct val="200000"/>
-              </a:lnSpc>
-            </a:pPr>
-            <a:endParaRPr lang="pt-BR" b="0" i="0" dirty="0">
-              <a:solidFill>
-                <a:srgbClr val="333333"/>
-              </a:solidFill>
-              <a:effectLst/>
-              <a:latin typeface="Ubuntu"/>
-            </a:endParaRPr>
-          </a:p>
-          <a:p>
-            <a:pPr algn="l">
-              <a:lnSpc>
-                <a:spcPct val="200000"/>
-              </a:lnSpc>
-            </a:pPr>
-            <a:r>
-              <a:rPr lang="pt-BR" b="0" i="0" dirty="0">
-                <a:solidFill>
-                  <a:srgbClr val="333333"/>
-                </a:solidFill>
-                <a:effectLst/>
-                <a:latin typeface="Ubuntu"/>
-              </a:rPr>
-              <a:t>3b) </a:t>
-            </a:r>
-            <a:r>
-              <a:rPr lang="en-GB" b="0" i="0" dirty="0">
-                <a:solidFill>
-                  <a:srgbClr val="333333"/>
-                </a:solidFill>
-                <a:effectLst/>
-                <a:latin typeface="Ubuntu"/>
-              </a:rPr>
-              <a:t>ld_phyA_on_s02-t01_2020-07-12.norm.xlsx</a:t>
-            </a:r>
-            <a:endParaRPr lang="pt-BR" b="0" i="0" dirty="0">
-              <a:solidFill>
-                <a:srgbClr val="333333"/>
-              </a:solidFill>
-              <a:effectLst/>
-              <a:latin typeface="Ubuntu"/>
-            </a:endParaRPr>
+              <a:t>Folders vs. Files</a:t>
+            </a:r>
           </a:p>
         </p:txBody>
       </p:sp>
     </p:spTree>
     <p:extLst>
       <p:ext uri="{BB962C8B-B14F-4D97-AF65-F5344CB8AC3E}">
-        <p14:creationId xmlns:p14="http://schemas.microsoft.com/office/powerpoint/2010/main" val="265655309"/>
+        <p14:creationId xmlns:p14="http://schemas.microsoft.com/office/powerpoint/2010/main" val="3254864951"/>
       </p:ext>
     </p:extLst>
   </p:cSld>
@@ -7149,8 +6963,8 @@
         </p:nvSpPr>
         <p:spPr>
           <a:xfrm>
-            <a:off x="847780" y="1379400"/>
-            <a:ext cx="9751569" cy="2246769"/>
+            <a:off x="1363735" y="1129464"/>
+            <a:ext cx="9464530" cy="1384995"/>
           </a:xfrm>
           <a:prstGeom prst="rect">
             <a:avLst/>
@@ -7163,32 +6977,17 @@
           </a:bodyPr>
           <a:lstStyle/>
           <a:p>
-            <a:pPr algn="just"/>
-            <a:endParaRPr lang="en-GB" sz="2800" u="sng" dirty="0">
-              <a:solidFill>
-                <a:srgbClr val="0070C0"/>
-              </a:solidFill>
-            </a:endParaRPr>
-          </a:p>
-          <a:p>
-            <a:pPr marL="457200" indent="-457200">
-              <a:buFont typeface="Arial" panose="020B0604020202020204" pitchFamily="34" charset="0"/>
-              <a:buChar char="•"/>
-            </a:pPr>
             <a:r>
               <a:rPr lang="en-GB" sz="2800" dirty="0">
                 <a:solidFill>
                   <a:srgbClr val="0070C0"/>
                 </a:solidFill>
               </a:rPr>
-              <a:t>Folders permit grouping relevant data together</a:t>
-            </a:r>
-          </a:p>
-          <a:p>
-            <a:pPr marL="457200" indent="-457200">
-              <a:buFont typeface="Arial" panose="020B0604020202020204" pitchFamily="34" charset="0"/>
-              <a:buChar char="•"/>
-            </a:pPr>
+              <a:t> </a:t>
+            </a:r>
+          </a:p>
+          <a:p>
+            <a:pPr algn="ctr"/>
             <a:endParaRPr lang="en-GB" sz="2800" dirty="0">
               <a:solidFill>
                 <a:srgbClr val="0070C0"/>
@@ -7196,43 +6995,24 @@
             </a:endParaRPr>
           </a:p>
           <a:p>
-            <a:pPr marL="457200" indent="-457200">
-              <a:buFont typeface="Arial" panose="020B0604020202020204" pitchFamily="34" charset="0"/>
-              <a:buChar char="•"/>
-            </a:pPr>
-            <a:r>
-              <a:rPr lang="pl-PL" sz="2800" dirty="0">
-                <a:solidFill>
-                  <a:srgbClr val="0070C0"/>
-                </a:solidFill>
-              </a:rPr>
-              <a:t>Folders help to keep files names short</a:t>
-            </a:r>
-            <a:endParaRPr lang="en-GB" sz="2800" dirty="0">
-              <a:solidFill>
-                <a:srgbClr val="0070C0"/>
-              </a:solidFill>
-            </a:endParaRPr>
-          </a:p>
-          <a:p>
-            <a:pPr marL="457200" indent="-457200">
-              <a:buFont typeface="Arial" panose="020B0604020202020204" pitchFamily="34" charset="0"/>
-              <a:buChar char="•"/>
-            </a:pPr>
-            <a:endParaRPr lang="en-GB" sz="2800" dirty="0">
-              <a:solidFill>
-                <a:srgbClr val="0070C0"/>
-              </a:solidFill>
-            </a:endParaRPr>
+            <a:pPr algn="ctr"/>
+            <a:r>
+              <a:rPr lang="en-GB" sz="2800" dirty="0">
+                <a:solidFill>
+                  <a:srgbClr val="0070C0"/>
+                </a:solidFill>
+              </a:rPr>
+              <a:t>Folders vs Files</a:t>
+            </a:r>
           </a:p>
         </p:txBody>
       </p:sp>
       <p:pic>
         <p:nvPicPr>
-          <p:cNvPr id="6" name="Picture 2" descr="Ed_DaSH">
-            <a:extLst>
-              <a:ext uri="{FF2B5EF4-FFF2-40B4-BE49-F238E27FC236}">
-                <a16:creationId xmlns:a16="http://schemas.microsoft.com/office/drawing/2014/main" id="{6F3CF586-06D2-46C3-A4A3-130E31C4A16F}"/>
+          <p:cNvPr id="4" name="Picture 2" descr="Ed_DaSH">
+            <a:extLst>
+              <a:ext uri="{FF2B5EF4-FFF2-40B4-BE49-F238E27FC236}">
+                <a16:creationId xmlns:a16="http://schemas.microsoft.com/office/drawing/2014/main" id="{A783256F-E39E-4712-96B0-240BD611CFEB}"/>
               </a:ext>
             </a:extLst>
           </p:cNvPr>
@@ -7242,7 +7022,7 @@
           <p:nvPr/>
         </p:nvPicPr>
         <p:blipFill>
-          <a:blip r:embed="rId3" cstate="hqprint">
+          <a:blip r:embed="rId2" cstate="hqprint">
             <a:extLst>
               <a:ext uri="{28A0092B-C50C-407E-A947-70E740481C1C}">
                 <a14:useLocalDpi xmlns:a14="http://schemas.microsoft.com/office/drawing/2010/main" val="0"/>
@@ -7276,174 +7056,6 @@
       </p:pic>
       <p:sp>
         <p:nvSpPr>
-          <p:cNvPr id="7" name="Title 1">
-            <a:extLst>
-              <a:ext uri="{FF2B5EF4-FFF2-40B4-BE49-F238E27FC236}">
-                <a16:creationId xmlns:a16="http://schemas.microsoft.com/office/drawing/2014/main" id="{B8224CED-57FE-204B-B358-FE8934FB9381}"/>
-              </a:ext>
-            </a:extLst>
-          </p:cNvPr>
-          <p:cNvSpPr>
-            <a:spLocks noGrp="1"/>
-          </p:cNvSpPr>
-          <p:nvPr>
-            <p:ph type="title"/>
-          </p:nvPr>
-        </p:nvSpPr>
-        <p:spPr>
-          <a:xfrm>
-            <a:off x="838200" y="365125"/>
-            <a:ext cx="10515600" cy="1325563"/>
-          </a:xfrm>
-        </p:spPr>
-        <p:txBody>
-          <a:bodyPr/>
-          <a:lstStyle/>
-          <a:p>
-            <a:r>
-              <a:rPr lang="en-GB" dirty="0"/>
-              <a:t>Folders vs. Files</a:t>
-            </a:r>
-          </a:p>
-        </p:txBody>
-      </p:sp>
-    </p:spTree>
-    <p:extLst>
-      <p:ext uri="{BB962C8B-B14F-4D97-AF65-F5344CB8AC3E}">
-        <p14:creationId xmlns:p14="http://schemas.microsoft.com/office/powerpoint/2010/main" val="3254864951"/>
-      </p:ext>
-    </p:extLst>
-  </p:cSld>
-  <p:clrMapOvr>
-    <a:masterClrMapping/>
-  </p:clrMapOvr>
-</p:sld>
-</file>
-
-<file path=ppt/slides/slide17.xml><?xml version="1.0" encoding="utf-8"?>
-<p:sld xmlns:a="http://schemas.openxmlformats.org/drawingml/2006/main" xmlns:r="http://schemas.openxmlformats.org/officeDocument/2006/relationships" xmlns:p="http://schemas.openxmlformats.org/presentationml/2006/main">
-  <p:cSld>
-    <p:spTree>
-      <p:nvGrpSpPr>
-        <p:cNvPr id="1" name=""/>
-        <p:cNvGrpSpPr/>
-        <p:nvPr/>
-      </p:nvGrpSpPr>
-      <p:grpSpPr>
-        <a:xfrm>
-          <a:off x="0" y="0"/>
-          <a:ext cx="0" cy="0"/>
-          <a:chOff x="0" y="0"/>
-          <a:chExt cx="0" cy="0"/>
-        </a:xfrm>
-      </p:grpSpPr>
-      <p:sp>
-        <p:nvSpPr>
-          <p:cNvPr id="5" name="TextBox 4">
-            <a:extLst>
-              <a:ext uri="{FF2B5EF4-FFF2-40B4-BE49-F238E27FC236}">
-                <a16:creationId xmlns:a16="http://schemas.microsoft.com/office/drawing/2014/main" id="{3A7A1F5C-9C70-4DE3-BA39-7835B2935EB3}"/>
-              </a:ext>
-            </a:extLst>
-          </p:cNvPr>
-          <p:cNvSpPr txBox="1"/>
-          <p:nvPr/>
-        </p:nvSpPr>
-        <p:spPr>
-          <a:xfrm>
-            <a:off x="1363735" y="1129464"/>
-            <a:ext cx="9464530" cy="1384995"/>
-          </a:xfrm>
-          <a:prstGeom prst="rect">
-            <a:avLst/>
-          </a:prstGeom>
-          <a:noFill/>
-        </p:spPr>
-        <p:txBody>
-          <a:bodyPr wrap="square">
-            <a:spAutoFit/>
-          </a:bodyPr>
-          <a:lstStyle/>
-          <a:p>
-            <a:r>
-              <a:rPr lang="en-GB" sz="2800" dirty="0">
-                <a:solidFill>
-                  <a:srgbClr val="0070C0"/>
-                </a:solidFill>
-              </a:rPr>
-              <a:t> </a:t>
-            </a:r>
-          </a:p>
-          <a:p>
-            <a:pPr algn="ctr"/>
-            <a:endParaRPr lang="en-GB" sz="2800" dirty="0">
-              <a:solidFill>
-                <a:srgbClr val="0070C0"/>
-              </a:solidFill>
-            </a:endParaRPr>
-          </a:p>
-          <a:p>
-            <a:pPr algn="ctr"/>
-            <a:r>
-              <a:rPr lang="en-GB" sz="2800" dirty="0">
-                <a:solidFill>
-                  <a:srgbClr val="0070C0"/>
-                </a:solidFill>
-              </a:rPr>
-              <a:t>Folders vs Files</a:t>
-            </a:r>
-          </a:p>
-        </p:txBody>
-      </p:sp>
-      <p:pic>
-        <p:nvPicPr>
-          <p:cNvPr id="4" name="Picture 2" descr="Ed_DaSH">
-            <a:extLst>
-              <a:ext uri="{FF2B5EF4-FFF2-40B4-BE49-F238E27FC236}">
-                <a16:creationId xmlns:a16="http://schemas.microsoft.com/office/drawing/2014/main" id="{A783256F-E39E-4712-96B0-240BD611CFEB}"/>
-              </a:ext>
-            </a:extLst>
-          </p:cNvPr>
-          <p:cNvPicPr>
-            <a:picLocks noChangeAspect="1" noChangeArrowheads="1"/>
-          </p:cNvPicPr>
-          <p:nvPr/>
-        </p:nvPicPr>
-        <p:blipFill>
-          <a:blip r:embed="rId2" cstate="hqprint">
-            <a:extLst>
-              <a:ext uri="{28A0092B-C50C-407E-A947-70E740481C1C}">
-                <a14:useLocalDpi xmlns:a14="http://schemas.microsoft.com/office/drawing/2010/main" val="0"/>
-              </a:ext>
-            </a:extLst>
-          </a:blip>
-          <a:srcRect/>
-          <a:stretch>
-            <a:fillRect/>
-          </a:stretch>
-        </p:blipFill>
-        <p:spPr bwMode="auto">
-          <a:xfrm>
-            <a:off x="10820670" y="5458691"/>
-            <a:ext cx="1289214" cy="1325418"/>
-          </a:xfrm>
-          <a:prstGeom prst="rect">
-            <a:avLst/>
-          </a:prstGeom>
-          <a:noFill/>
-          <a:extLst>
-            <a:ext uri="{909E8E84-426E-40DD-AFC4-6F175D3DCCD1}">
-              <a14:hiddenFill xmlns:a14="http://schemas.microsoft.com/office/drawing/2010/main">
-                <a:solidFill>
-                  <a:srgbClr val="FFFFFF"/>
-                </a:solidFill>
-              </a14:hiddenFill>
-            </a:ext>
-          </a:extLst>
-        </p:spPr>
-      </p:pic>
-      <p:sp>
-        <p:nvSpPr>
           <p:cNvPr id="6" name="Title 1">
             <a:extLst>
               <a:ext uri="{FF2B5EF4-FFF2-40B4-BE49-F238E27FC236}">
@@ -7488,7 +7100,7 @@
 </p:sld>
 </file>
 
-<file path=ppt/slides/slide18.xml><?xml version="1.0" encoding="utf-8"?>
+<file path=ppt/slides/slide17.xml><?xml version="1.0" encoding="utf-8"?>
 <p:sld xmlns:a="http://schemas.openxmlformats.org/drawingml/2006/main" xmlns:r="http://schemas.openxmlformats.org/officeDocument/2006/relationships" xmlns:p="http://schemas.openxmlformats.org/presentationml/2006/main">
   <p:cSld>
     <p:spTree>
@@ -7583,7 +7195,7 @@
 </p:sld>
 </file>
 
-<file path=ppt/slides/slide19.xml><?xml version="1.0" encoding="utf-8"?>
+<file path=ppt/slides/slide18.xml><?xml version="1.0" encoding="utf-8"?>
 <p:sld xmlns:a="http://schemas.openxmlformats.org/drawingml/2006/main" xmlns:r="http://schemas.openxmlformats.org/officeDocument/2006/relationships" xmlns:p="http://schemas.openxmlformats.org/presentationml/2006/main">
   <p:cSld>
     <p:spTree>
@@ -7678,6 +7290,216 @@
 </p:sld>
 </file>
 
+<file path=ppt/slides/slide19.xml><?xml version="1.0" encoding="utf-8"?>
+<p:sld xmlns:a="http://schemas.openxmlformats.org/drawingml/2006/main" xmlns:r="http://schemas.openxmlformats.org/officeDocument/2006/relationships" xmlns:p="http://schemas.openxmlformats.org/presentationml/2006/main">
+  <p:cSld>
+    <p:spTree>
+      <p:nvGrpSpPr>
+        <p:cNvPr id="1" name=""/>
+        <p:cNvGrpSpPr/>
+        <p:nvPr/>
+      </p:nvGrpSpPr>
+      <p:grpSpPr>
+        <a:xfrm>
+          <a:off x="0" y="0"/>
+          <a:ext cx="0" cy="0"/>
+          <a:chOff x="0" y="0"/>
+          <a:chExt cx="0" cy="0"/>
+        </a:xfrm>
+      </p:grpSpPr>
+      <p:sp>
+        <p:nvSpPr>
+          <p:cNvPr id="5" name="TextBox 4">
+            <a:extLst>
+              <a:ext uri="{FF2B5EF4-FFF2-40B4-BE49-F238E27FC236}">
+                <a16:creationId xmlns:a16="http://schemas.microsoft.com/office/drawing/2014/main" id="{3A7A1F5C-9C70-4DE3-BA39-7835B2935EB3}"/>
+              </a:ext>
+            </a:extLst>
+          </p:cNvPr>
+          <p:cNvSpPr txBox="1"/>
+          <p:nvPr/>
+        </p:nvSpPr>
+        <p:spPr>
+          <a:xfrm>
+            <a:off x="987288" y="858421"/>
+            <a:ext cx="8837169" cy="5262979"/>
+          </a:xfrm>
+          <a:prstGeom prst="rect">
+            <a:avLst/>
+          </a:prstGeom>
+          <a:noFill/>
+        </p:spPr>
+        <p:txBody>
+          <a:bodyPr wrap="square">
+            <a:spAutoFit/>
+          </a:bodyPr>
+          <a:lstStyle/>
+          <a:p>
+            <a:pPr marL="457200" indent="-457200">
+              <a:buFont typeface="Arial" panose="020B0604020202020204" pitchFamily="34" charset="0"/>
+              <a:buChar char="•"/>
+            </a:pPr>
+            <a:r>
+              <a:rPr lang="en-GB" sz="2800" dirty="0">
+                <a:solidFill>
+                  <a:srgbClr val="0070C0"/>
+                </a:solidFill>
+              </a:rPr>
+              <a:t>Use folders to group related files. A single folder will make it easy to locate them.</a:t>
+            </a:r>
+            <a:endParaRPr lang="pl-PL" sz="2800" dirty="0">
+              <a:solidFill>
+                <a:srgbClr val="0070C0"/>
+              </a:solidFill>
+            </a:endParaRPr>
+          </a:p>
+          <a:p>
+            <a:pPr marL="457200" indent="-457200">
+              <a:buFont typeface="Arial" panose="020B0604020202020204" pitchFamily="34" charset="0"/>
+              <a:buChar char="•"/>
+            </a:pPr>
+            <a:endParaRPr lang="pl-PL" sz="2800" dirty="0">
+              <a:solidFill>
+                <a:srgbClr val="0070C0"/>
+              </a:solidFill>
+            </a:endParaRPr>
+          </a:p>
+          <a:p>
+            <a:pPr marL="457200" indent="-457200">
+              <a:buFont typeface="Arial" panose="020B0604020202020204" pitchFamily="34" charset="0"/>
+              <a:buChar char="•"/>
+            </a:pPr>
+            <a:r>
+              <a:rPr lang="en-GB" sz="2800" dirty="0">
+                <a:solidFill>
+                  <a:srgbClr val="0070C0"/>
+                </a:solidFill>
+              </a:rPr>
+              <a:t>Name folders appropriately: use descriptive names after the areas of work to which they relate.</a:t>
+            </a:r>
+            <a:endParaRPr lang="pl-PL" sz="2800" dirty="0">
+              <a:solidFill>
+                <a:srgbClr val="0070C0"/>
+              </a:solidFill>
+            </a:endParaRPr>
+          </a:p>
+          <a:p>
+            <a:pPr marL="457200" indent="-457200">
+              <a:buFont typeface="Arial" panose="020B0604020202020204" pitchFamily="34" charset="0"/>
+              <a:buChar char="•"/>
+            </a:pPr>
+            <a:endParaRPr lang="en-GB" sz="2800" dirty="0">
+              <a:solidFill>
+                <a:srgbClr val="0070C0"/>
+              </a:solidFill>
+            </a:endParaRPr>
+          </a:p>
+          <a:p>
+            <a:pPr marL="457200" indent="-457200">
+              <a:buFont typeface="Arial" panose="020B0604020202020204" pitchFamily="34" charset="0"/>
+              <a:buChar char="•"/>
+            </a:pPr>
+            <a:r>
+              <a:rPr lang="en-GB" sz="2800" dirty="0">
+                <a:solidFill>
+                  <a:srgbClr val="0070C0"/>
+                </a:solidFill>
+              </a:rPr>
+              <a:t>Structure folders hierarchically: use broader topics for your main folders and increase in specificity as you go down the hierarchy.</a:t>
+            </a:r>
+            <a:endParaRPr lang="pl-PL" sz="2800" dirty="0">
+              <a:solidFill>
+                <a:srgbClr val="0070C0"/>
+              </a:solidFill>
+            </a:endParaRPr>
+          </a:p>
+          <a:p>
+            <a:pPr marL="457200" indent="-457200">
+              <a:buFont typeface="Arial" panose="020B0604020202020204" pitchFamily="34" charset="0"/>
+              <a:buChar char="•"/>
+            </a:pPr>
+            <a:endParaRPr lang="en-GB" sz="2800" dirty="0">
+              <a:solidFill>
+                <a:srgbClr val="0070C0"/>
+              </a:solidFill>
+            </a:endParaRPr>
+          </a:p>
+          <a:p>
+            <a:pPr marL="457200" indent="-457200">
+              <a:buFont typeface="Arial" panose="020B0604020202020204" pitchFamily="34" charset="0"/>
+              <a:buChar char="•"/>
+            </a:pPr>
+            <a:r>
+              <a:rPr lang="en-GB" sz="2800" dirty="0">
+                <a:solidFill>
+                  <a:srgbClr val="0070C0"/>
+                </a:solidFill>
+              </a:rPr>
+              <a:t>Be consistent: agree on a naming convention from the outset of your research project</a:t>
+            </a:r>
+          </a:p>
+        </p:txBody>
+      </p:sp>
+      <p:pic>
+        <p:nvPicPr>
+          <p:cNvPr id="6" name="Picture 2" descr="Ed_DaSH">
+            <a:extLst>
+              <a:ext uri="{FF2B5EF4-FFF2-40B4-BE49-F238E27FC236}">
+                <a16:creationId xmlns:a16="http://schemas.microsoft.com/office/drawing/2014/main" id="{6F3CF586-06D2-46C3-A4A3-130E31C4A16F}"/>
+              </a:ext>
+            </a:extLst>
+          </p:cNvPr>
+          <p:cNvPicPr>
+            <a:picLocks noChangeAspect="1" noChangeArrowheads="1"/>
+          </p:cNvPicPr>
+          <p:nvPr/>
+        </p:nvPicPr>
+        <p:blipFill>
+          <a:blip r:embed="rId2" cstate="hqprint">
+            <a:extLst>
+              <a:ext uri="{28A0092B-C50C-407E-A947-70E740481C1C}">
+                <a14:useLocalDpi xmlns:a14="http://schemas.microsoft.com/office/drawing/2010/main" val="0"/>
+              </a:ext>
+            </a:extLst>
+          </a:blip>
+          <a:srcRect/>
+          <a:stretch>
+            <a:fillRect/>
+          </a:stretch>
+        </p:blipFill>
+        <p:spPr bwMode="auto">
+          <a:xfrm>
+            <a:off x="10820670" y="5458691"/>
+            <a:ext cx="1289214" cy="1325418"/>
+          </a:xfrm>
+          <a:prstGeom prst="rect">
+            <a:avLst/>
+          </a:prstGeom>
+          <a:noFill/>
+          <a:extLst>
+            <a:ext uri="{909E8E84-426E-40DD-AFC4-6F175D3DCCD1}">
+              <a14:hiddenFill xmlns:a14="http://schemas.microsoft.com/office/drawing/2010/main">
+                <a:solidFill>
+                  <a:srgbClr val="FFFFFF"/>
+                </a:solidFill>
+              </a14:hiddenFill>
+            </a:ext>
+          </a:extLst>
+        </p:spPr>
+      </p:pic>
+    </p:spTree>
+    <p:extLst>
+      <p:ext uri="{BB962C8B-B14F-4D97-AF65-F5344CB8AC3E}">
+        <p14:creationId xmlns:p14="http://schemas.microsoft.com/office/powerpoint/2010/main" val="2431730110"/>
+      </p:ext>
+    </p:extLst>
+  </p:cSld>
+  <p:clrMapOvr>
+    <a:masterClrMapping/>
+  </p:clrMapOvr>
+</p:sld>
+</file>
+
 <file path=ppt/slides/slide2.xml><?xml version="1.0" encoding="utf-8"?>
 <p:sld xmlns:a="http://schemas.openxmlformats.org/drawingml/2006/main" xmlns:r="http://schemas.openxmlformats.org/officeDocument/2006/relationships" xmlns:p="http://schemas.openxmlformats.org/presentationml/2006/main">
   <p:cSld>
@@ -7979,8 +7801,8 @@
         </p:nvSpPr>
         <p:spPr>
           <a:xfrm>
-            <a:off x="987288" y="858421"/>
-            <a:ext cx="8837169" cy="5262979"/>
+            <a:off x="1363735" y="1129464"/>
+            <a:ext cx="9464530" cy="1384995"/>
           </a:xfrm>
           <a:prstGeom prst="rect">
             <a:avLst/>
@@ -7993,59 +7815,17 @@
           </a:bodyPr>
           <a:lstStyle/>
           <a:p>
-            <a:pPr marL="457200" indent="-457200">
-              <a:buFont typeface="Arial" panose="020B0604020202020204" pitchFamily="34" charset="0"/>
-              <a:buChar char="•"/>
-            </a:pPr>
             <a:r>
               <a:rPr lang="en-GB" sz="2800" dirty="0">
                 <a:solidFill>
                   <a:srgbClr val="0070C0"/>
                 </a:solidFill>
               </a:rPr>
-              <a:t>Use folders to group related files. A single folder will make it easy to locate them.</a:t>
-            </a:r>
-            <a:endParaRPr lang="pl-PL" sz="2800" dirty="0">
-              <a:solidFill>
-                <a:srgbClr val="0070C0"/>
-              </a:solidFill>
-            </a:endParaRPr>
-          </a:p>
-          <a:p>
-            <a:pPr marL="457200" indent="-457200">
-              <a:buFont typeface="Arial" panose="020B0604020202020204" pitchFamily="34" charset="0"/>
-              <a:buChar char="•"/>
-            </a:pPr>
-            <a:endParaRPr lang="pl-PL" sz="2800" dirty="0">
-              <a:solidFill>
-                <a:srgbClr val="0070C0"/>
-              </a:solidFill>
-            </a:endParaRPr>
-          </a:p>
-          <a:p>
-            <a:pPr marL="457200" indent="-457200">
-              <a:buFont typeface="Arial" panose="020B0604020202020204" pitchFamily="34" charset="0"/>
-              <a:buChar char="•"/>
-            </a:pPr>
-            <a:r>
-              <a:rPr lang="en-GB" sz="2800" dirty="0">
-                <a:solidFill>
-                  <a:srgbClr val="0070C0"/>
-                </a:solidFill>
-              </a:rPr>
-              <a:t>Name folders appropriately: use descriptive names after the areas of work to which they relate.</a:t>
-            </a:r>
-            <a:endParaRPr lang="pl-PL" sz="2800" dirty="0">
-              <a:solidFill>
-                <a:srgbClr val="0070C0"/>
-              </a:solidFill>
-            </a:endParaRPr>
-          </a:p>
-          <a:p>
-            <a:pPr marL="457200" indent="-457200">
-              <a:buFont typeface="Arial" panose="020B0604020202020204" pitchFamily="34" charset="0"/>
-              <a:buChar char="•"/>
-            </a:pPr>
+              <a:t> </a:t>
+            </a:r>
+          </a:p>
+          <a:p>
+            <a:pPr algn="ctr"/>
             <a:endParaRPr lang="en-GB" sz="2800" dirty="0">
               <a:solidFill>
                 <a:srgbClr val="0070C0"/>
@@ -8053,57 +7833,37 @@
             </a:endParaRPr>
           </a:p>
           <a:p>
-            <a:pPr marL="457200" indent="-457200">
-              <a:buFont typeface="Arial" panose="020B0604020202020204" pitchFamily="34" charset="0"/>
-              <a:buChar char="•"/>
-            </a:pPr>
+            <a:pPr algn="ctr"/>
             <a:r>
               <a:rPr lang="en-GB" sz="2800" dirty="0">
                 <a:solidFill>
                   <a:srgbClr val="0070C0"/>
                 </a:solidFill>
               </a:rPr>
-              <a:t>Structure folders hierarchically: use broader topics for your main folders and increase in specificity as you go down the hierarchy.</a:t>
-            </a:r>
-            <a:endParaRPr lang="pl-PL" sz="2800" dirty="0">
-              <a:solidFill>
-                <a:srgbClr val="0070C0"/>
-              </a:solidFill>
-            </a:endParaRPr>
-          </a:p>
-          <a:p>
-            <a:pPr marL="457200" indent="-457200">
-              <a:buFont typeface="Arial" panose="020B0604020202020204" pitchFamily="34" charset="0"/>
-              <a:buChar char="•"/>
-            </a:pPr>
+              <a:t>Organization </a:t>
+            </a:r>
+            <a:r>
+              <a:rPr lang="pl-PL" sz="2800" dirty="0">
+                <a:solidFill>
+                  <a:srgbClr val="0070C0"/>
+                </a:solidFill>
+              </a:rPr>
+              <a:t>strategies</a:t>
+            </a:r>
             <a:endParaRPr lang="en-GB" sz="2800" dirty="0">
               <a:solidFill>
                 <a:srgbClr val="0070C0"/>
               </a:solidFill>
             </a:endParaRPr>
           </a:p>
-          <a:p>
-            <a:pPr marL="457200" indent="-457200">
-              <a:buFont typeface="Arial" panose="020B0604020202020204" pitchFamily="34" charset="0"/>
-              <a:buChar char="•"/>
-            </a:pPr>
-            <a:r>
-              <a:rPr lang="en-GB" sz="2800" dirty="0">
-                <a:solidFill>
-                  <a:srgbClr val="0070C0"/>
-                </a:solidFill>
-              </a:rPr>
-              <a:t>Be consistent: agree on a naming convention from the outset of your research project</a:t>
-            </a:r>
-          </a:p>
         </p:txBody>
       </p:sp>
       <p:pic>
         <p:nvPicPr>
-          <p:cNvPr id="6" name="Picture 2" descr="Ed_DaSH">
-            <a:extLst>
-              <a:ext uri="{FF2B5EF4-FFF2-40B4-BE49-F238E27FC236}">
-                <a16:creationId xmlns:a16="http://schemas.microsoft.com/office/drawing/2014/main" id="{6F3CF586-06D2-46C3-A4A3-130E31C4A16F}"/>
+          <p:cNvPr id="4" name="Picture 2" descr="Ed_DaSH">
+            <a:extLst>
+              <a:ext uri="{FF2B5EF4-FFF2-40B4-BE49-F238E27FC236}">
+                <a16:creationId xmlns:a16="http://schemas.microsoft.com/office/drawing/2014/main" id="{A783256F-E39E-4712-96B0-240BD611CFEB}"/>
               </a:ext>
             </a:extLst>
           </p:cNvPr>
@@ -8113,7 +7873,7 @@
           <p:nvPr/>
         </p:nvPicPr>
         <p:blipFill>
-          <a:blip r:embed="rId2" cstate="hqprint">
+          <a:blip r:embed="rId3" cstate="hqprint">
             <a:extLst>
               <a:ext uri="{28A0092B-C50C-407E-A947-70E740481C1C}">
                 <a14:useLocalDpi xmlns:a14="http://schemas.microsoft.com/office/drawing/2010/main" val="0"/>
@@ -8145,10 +7905,43 @@
           </a:extLst>
         </p:spPr>
       </p:pic>
+      <p:sp>
+        <p:nvSpPr>
+          <p:cNvPr id="6" name="Title 1">
+            <a:extLst>
+              <a:ext uri="{FF2B5EF4-FFF2-40B4-BE49-F238E27FC236}">
+                <a16:creationId xmlns:a16="http://schemas.microsoft.com/office/drawing/2014/main" id="{10B0AC5F-ED69-0649-AE97-5EBE8C0C0533}"/>
+              </a:ext>
+            </a:extLst>
+          </p:cNvPr>
+          <p:cNvSpPr>
+            <a:spLocks noGrp="1"/>
+          </p:cNvSpPr>
+          <p:nvPr>
+            <p:ph type="title"/>
+          </p:nvPr>
+        </p:nvSpPr>
+        <p:spPr>
+          <a:xfrm>
+            <a:off x="838200" y="365125"/>
+            <a:ext cx="10515600" cy="1325563"/>
+          </a:xfrm>
+        </p:spPr>
+        <p:txBody>
+          <a:bodyPr/>
+          <a:lstStyle/>
+          <a:p>
+            <a:r>
+              <a:rPr lang="en-GB" dirty="0"/>
+              <a:t>Exercise 4</a:t>
+            </a:r>
+          </a:p>
+        </p:txBody>
+      </p:sp>
     </p:spTree>
     <p:extLst>
       <p:ext uri="{BB962C8B-B14F-4D97-AF65-F5344CB8AC3E}">
-        <p14:creationId xmlns:p14="http://schemas.microsoft.com/office/powerpoint/2010/main" val="2431730110"/>
+        <p14:creationId xmlns:p14="http://schemas.microsoft.com/office/powerpoint/2010/main" val="1908239480"/>
       </p:ext>
     </p:extLst>
   </p:cSld>
@@ -8175,83 +7968,12 @@
           <a:chExt cx="0" cy="0"/>
         </a:xfrm>
       </p:grpSpPr>
-      <p:sp>
-        <p:nvSpPr>
-          <p:cNvPr id="5" name="TextBox 4">
-            <a:extLst>
-              <a:ext uri="{FF2B5EF4-FFF2-40B4-BE49-F238E27FC236}">
-                <a16:creationId xmlns:a16="http://schemas.microsoft.com/office/drawing/2014/main" id="{3A7A1F5C-9C70-4DE3-BA39-7835B2935EB3}"/>
-              </a:ext>
-            </a:extLst>
-          </p:cNvPr>
-          <p:cNvSpPr txBox="1"/>
-          <p:nvPr/>
-        </p:nvSpPr>
-        <p:spPr>
-          <a:xfrm>
-            <a:off x="1363735" y="1129464"/>
-            <a:ext cx="9464530" cy="1384995"/>
-          </a:xfrm>
-          <a:prstGeom prst="rect">
-            <a:avLst/>
-          </a:prstGeom>
-          <a:noFill/>
-        </p:spPr>
-        <p:txBody>
-          <a:bodyPr wrap="square">
-            <a:spAutoFit/>
-          </a:bodyPr>
-          <a:lstStyle/>
-          <a:p>
-            <a:r>
-              <a:rPr lang="en-GB" sz="2800" dirty="0">
-                <a:solidFill>
-                  <a:srgbClr val="0070C0"/>
-                </a:solidFill>
-              </a:rPr>
-              <a:t> </a:t>
-            </a:r>
-          </a:p>
-          <a:p>
-            <a:pPr algn="ctr"/>
-            <a:endParaRPr lang="en-GB" sz="2800" dirty="0">
-              <a:solidFill>
-                <a:srgbClr val="0070C0"/>
-              </a:solidFill>
-            </a:endParaRPr>
-          </a:p>
-          <a:p>
-            <a:pPr algn="ctr"/>
-            <a:r>
-              <a:rPr lang="en-GB" sz="2800" dirty="0">
-                <a:solidFill>
-                  <a:srgbClr val="0070C0"/>
-                </a:solidFill>
-              </a:rPr>
-              <a:t>Organization </a:t>
-            </a:r>
-            <a:r>
-              <a:rPr lang="pl-PL" sz="2800" dirty="0">
-                <a:solidFill>
-                  <a:srgbClr val="0070C0"/>
-                </a:solidFill>
-              </a:rPr>
-              <a:t>strategies</a:t>
-            </a:r>
-            <a:endParaRPr lang="en-GB" sz="2800" dirty="0">
-              <a:solidFill>
-                <a:srgbClr val="0070C0"/>
-              </a:solidFill>
-            </a:endParaRPr>
-          </a:p>
-        </p:txBody>
-      </p:sp>
       <p:pic>
         <p:nvPicPr>
-          <p:cNvPr id="4" name="Picture 2" descr="Ed_DaSH">
-            <a:extLst>
-              <a:ext uri="{FF2B5EF4-FFF2-40B4-BE49-F238E27FC236}">
-                <a16:creationId xmlns:a16="http://schemas.microsoft.com/office/drawing/2014/main" id="{A783256F-E39E-4712-96B0-240BD611CFEB}"/>
+          <p:cNvPr id="6" name="Picture 2" descr="Ed_DaSH">
+            <a:extLst>
+              <a:ext uri="{FF2B5EF4-FFF2-40B4-BE49-F238E27FC236}">
+                <a16:creationId xmlns:a16="http://schemas.microsoft.com/office/drawing/2014/main" id="{6F3CF586-06D2-46C3-A4A3-130E31C4A16F}"/>
               </a:ext>
             </a:extLst>
           </p:cNvPr>
@@ -8295,23 +8017,151 @@
       </p:pic>
       <p:sp>
         <p:nvSpPr>
-          <p:cNvPr id="6" name="Title 1">
-            <a:extLst>
-              <a:ext uri="{FF2B5EF4-FFF2-40B4-BE49-F238E27FC236}">
-                <a16:creationId xmlns:a16="http://schemas.microsoft.com/office/drawing/2014/main" id="{10B0AC5F-ED69-0649-AE97-5EBE8C0C0533}"/>
-              </a:ext>
-            </a:extLst>
-          </p:cNvPr>
-          <p:cNvSpPr>
-            <a:spLocks noGrp="1"/>
-          </p:cNvSpPr>
-          <p:nvPr>
-            <p:ph type="title"/>
-          </p:nvPr>
+          <p:cNvPr id="9" name="TextBox 8">
+            <a:extLst>
+              <a:ext uri="{FF2B5EF4-FFF2-40B4-BE49-F238E27FC236}">
+                <a16:creationId xmlns:a16="http://schemas.microsoft.com/office/drawing/2014/main" id="{BAD6A8BB-6E1B-5E43-83C2-4F8F05A73369}"/>
+              </a:ext>
+            </a:extLst>
+          </p:cNvPr>
+          <p:cNvSpPr txBox="1"/>
+          <p:nvPr/>
         </p:nvSpPr>
         <p:spPr>
           <a:xfrm>
-            <a:off x="838200" y="365125"/>
+            <a:off x="948099" y="1355649"/>
+            <a:ext cx="10048452" cy="4401205"/>
+          </a:xfrm>
+          <a:prstGeom prst="rect">
+            <a:avLst/>
+          </a:prstGeom>
+          <a:noFill/>
+        </p:spPr>
+        <p:txBody>
+          <a:bodyPr wrap="square">
+            <a:spAutoFit/>
+          </a:bodyPr>
+          <a:lstStyle/>
+          <a:p>
+            <a:pPr marL="457200" indent="-457200">
+              <a:buFont typeface="Arial" panose="020B0604020202020204" pitchFamily="34" charset="0"/>
+              <a:buChar char="•"/>
+            </a:pPr>
+            <a:r>
+              <a:rPr lang="en-GB" sz="2800" dirty="0">
+                <a:solidFill>
+                  <a:srgbClr val="0070C0"/>
+                </a:solidFill>
+              </a:rPr>
+              <a:t>Back up (almost) everything created by a human or recorded by a machine as soon as it is created.</a:t>
+            </a:r>
+            <a:endParaRPr lang="pl-PL" sz="2800" dirty="0">
+              <a:solidFill>
+                <a:srgbClr val="0070C0"/>
+              </a:solidFill>
+            </a:endParaRPr>
+          </a:p>
+          <a:p>
+            <a:pPr marL="457200" indent="-457200">
+              <a:buFont typeface="Arial" panose="020B0604020202020204" pitchFamily="34" charset="0"/>
+              <a:buChar char="•"/>
+            </a:pPr>
+            <a:endParaRPr lang="en-GB" sz="2800" dirty="0">
+              <a:solidFill>
+                <a:srgbClr val="0070C0"/>
+              </a:solidFill>
+            </a:endParaRPr>
+          </a:p>
+          <a:p>
+            <a:pPr marL="457200" indent="-457200">
+              <a:buFont typeface="Arial" panose="020B0604020202020204" pitchFamily="34" charset="0"/>
+              <a:buChar char="•"/>
+            </a:pPr>
+            <a:r>
+              <a:rPr lang="en-GB" sz="2800" dirty="0">
+                <a:solidFill>
+                  <a:srgbClr val="0070C0"/>
+                </a:solidFill>
+              </a:rPr>
+              <a:t>Always backup your files in 3 places, at least one should be off-site.</a:t>
+            </a:r>
+            <a:endParaRPr lang="pl-PL" sz="2800" dirty="0">
+              <a:solidFill>
+                <a:srgbClr val="0070C0"/>
+              </a:solidFill>
+            </a:endParaRPr>
+          </a:p>
+          <a:p>
+            <a:pPr marL="457200" indent="-457200">
+              <a:buFont typeface="Arial" panose="020B0604020202020204" pitchFamily="34" charset="0"/>
+              <a:buChar char="•"/>
+            </a:pPr>
+            <a:endParaRPr lang="en-GB" sz="2800" dirty="0">
+              <a:solidFill>
+                <a:srgbClr val="0070C0"/>
+              </a:solidFill>
+            </a:endParaRPr>
+          </a:p>
+          <a:p>
+            <a:pPr marL="457200" indent="-457200">
+              <a:buFont typeface="Arial" panose="020B0604020202020204" pitchFamily="34" charset="0"/>
+              <a:buChar char="•"/>
+            </a:pPr>
+            <a:r>
+              <a:rPr lang="en-GB" sz="2800" dirty="0">
+                <a:solidFill>
+                  <a:srgbClr val="0070C0"/>
+                </a:solidFill>
+              </a:rPr>
+              <a:t>USB sticks are a failure-prone option and are not a valid solution for backup of scientific data</a:t>
+            </a:r>
+          </a:p>
+          <a:p>
+            <a:pPr marL="457200" indent="-457200">
+              <a:buFont typeface="Arial" panose="020B0604020202020204" pitchFamily="34" charset="0"/>
+              <a:buChar char="•"/>
+            </a:pPr>
+            <a:endParaRPr lang="en-GB" sz="2800" dirty="0">
+              <a:solidFill>
+                <a:srgbClr val="0070C0"/>
+              </a:solidFill>
+            </a:endParaRPr>
+          </a:p>
+          <a:p>
+            <a:pPr marL="457200" indent="-457200">
+              <a:buFont typeface="Arial" panose="020B0604020202020204" pitchFamily="34" charset="0"/>
+              <a:buChar char="•"/>
+            </a:pPr>
+            <a:r>
+              <a:rPr lang="en-GB" sz="2800" dirty="0">
+                <a:solidFill>
+                  <a:srgbClr val="0070C0"/>
+                </a:solidFill>
+              </a:rPr>
+              <a:t>A robust backup cannot be achieved manually</a:t>
+            </a:r>
+          </a:p>
+        </p:txBody>
+      </p:sp>
+      <p:sp>
+        <p:nvSpPr>
+          <p:cNvPr id="5" name="Title 1">
+            <a:extLst>
+              <a:ext uri="{FF2B5EF4-FFF2-40B4-BE49-F238E27FC236}">
+                <a16:creationId xmlns:a16="http://schemas.microsoft.com/office/drawing/2014/main" id="{A5D34E58-AF9E-4741-A5B2-3ABCF1C42AF5}"/>
+              </a:ext>
+            </a:extLst>
+          </p:cNvPr>
+          <p:cNvSpPr>
+            <a:spLocks noGrp="1"/>
+          </p:cNvSpPr>
+          <p:nvPr>
+            <p:ph type="title"/>
+          </p:nvPr>
+        </p:nvSpPr>
+        <p:spPr>
+          <a:xfrm>
+            <a:off x="838200" y="231013"/>
             <a:ext cx="10515600" cy="1325563"/>
           </a:xfrm>
         </p:spPr>
@@ -8321,7 +8171,7 @@
           <a:p>
             <a:r>
               <a:rPr lang="en-GB" dirty="0"/>
-              <a:t>Exercise 4</a:t>
+              <a:t>Backing up your project files and folders</a:t>
             </a:r>
           </a:p>
         </p:txBody>
@@ -8329,7 +8179,7 @@
     </p:spTree>
     <p:extLst>
       <p:ext uri="{BB962C8B-B14F-4D97-AF65-F5344CB8AC3E}">
-        <p14:creationId xmlns:p14="http://schemas.microsoft.com/office/powerpoint/2010/main" val="1908239480"/>
+        <p14:creationId xmlns:p14="http://schemas.microsoft.com/office/powerpoint/2010/main" val="693671975"/>
       </p:ext>
     </p:extLst>
   </p:cSld>
@@ -8356,12 +8206,197 @@
           <a:chExt cx="0" cy="0"/>
         </a:xfrm>
       </p:grpSpPr>
+      <p:sp>
+        <p:nvSpPr>
+          <p:cNvPr id="5" name="TextBox 4">
+            <a:extLst>
+              <a:ext uri="{FF2B5EF4-FFF2-40B4-BE49-F238E27FC236}">
+                <a16:creationId xmlns:a16="http://schemas.microsoft.com/office/drawing/2014/main" id="{3A7A1F5C-9C70-4DE3-BA39-7835B2935EB3}"/>
+              </a:ext>
+            </a:extLst>
+          </p:cNvPr>
+          <p:cNvSpPr txBox="1"/>
+          <p:nvPr/>
+        </p:nvSpPr>
+        <p:spPr>
+          <a:xfrm>
+            <a:off x="1363735" y="1568376"/>
+            <a:ext cx="9464530" cy="4401205"/>
+          </a:xfrm>
+          <a:prstGeom prst="rect">
+            <a:avLst/>
+          </a:prstGeom>
+          <a:noFill/>
+        </p:spPr>
+        <p:txBody>
+          <a:bodyPr wrap="square">
+            <a:spAutoFit/>
+          </a:bodyPr>
+          <a:lstStyle/>
+          <a:p>
+            <a:pPr marL="457200" indent="-457200">
+              <a:buFont typeface="Arial" panose="020B0604020202020204" pitchFamily="34" charset="0"/>
+              <a:buChar char="•"/>
+            </a:pPr>
+            <a:r>
+              <a:rPr lang="en-GB" sz="2800" dirty="0">
+                <a:solidFill>
+                  <a:srgbClr val="0070C0"/>
+                </a:solidFill>
+              </a:rPr>
+              <a:t>If you change the strategy document it in PROJECT_STRUCTURE </a:t>
+            </a:r>
+            <a:br>
+              <a:rPr lang="pl-PL" sz="2800" dirty="0">
+                <a:solidFill>
+                  <a:srgbClr val="0070C0"/>
+                </a:solidFill>
+              </a:rPr>
+            </a:br>
+            <a:r>
+              <a:rPr lang="pl-PL" sz="2800" dirty="0">
+                <a:solidFill>
+                  <a:srgbClr val="0070C0"/>
+                </a:solidFill>
+              </a:rPr>
+              <a:t>(</a:t>
+            </a:r>
+            <a:r>
+              <a:rPr lang="en-GB" sz="2800" dirty="0">
+                <a:solidFill>
+                  <a:srgbClr val="0070C0"/>
+                </a:solidFill>
+              </a:rPr>
+              <a:t>why you made the change and when</a:t>
+            </a:r>
+            <a:r>
+              <a:rPr lang="pl-PL" sz="2800" dirty="0">
+                <a:solidFill>
+                  <a:srgbClr val="0070C0"/>
+                </a:solidFill>
+              </a:rPr>
+              <a:t>)</a:t>
+            </a:r>
+            <a:r>
+              <a:rPr lang="en-GB" sz="2800" dirty="0">
+                <a:solidFill>
+                  <a:srgbClr val="0070C0"/>
+                </a:solidFill>
+              </a:rPr>
+              <a:t> </a:t>
+            </a:r>
+            <a:endParaRPr lang="pl-PL" sz="2800" dirty="0">
+              <a:solidFill>
+                <a:srgbClr val="0070C0"/>
+              </a:solidFill>
+            </a:endParaRPr>
+          </a:p>
+          <a:p>
+            <a:pPr marL="457200" indent="-457200">
+              <a:buFont typeface="Arial" panose="020B0604020202020204" pitchFamily="34" charset="0"/>
+              <a:buChar char="•"/>
+            </a:pPr>
+            <a:endParaRPr lang="pl-PL" sz="2800" dirty="0">
+              <a:solidFill>
+                <a:srgbClr val="0070C0"/>
+              </a:solidFill>
+            </a:endParaRPr>
+          </a:p>
+          <a:p>
+            <a:pPr marL="457200" indent="-457200">
+              <a:buFont typeface="Arial" panose="020B0604020202020204" pitchFamily="34" charset="0"/>
+              <a:buChar char="•"/>
+            </a:pPr>
+            <a:r>
+              <a:rPr lang="en-GB" sz="2800" dirty="0">
+                <a:solidFill>
+                  <a:srgbClr val="0070C0"/>
+                </a:solidFill>
+              </a:rPr>
+              <a:t>Update the locations and names of files which followed the old convention</a:t>
+            </a:r>
+            <a:endParaRPr lang="pl-PL" sz="2800" dirty="0">
+              <a:solidFill>
+                <a:srgbClr val="0070C0"/>
+              </a:solidFill>
+            </a:endParaRPr>
+          </a:p>
+          <a:p>
+            <a:pPr marL="457200" indent="-457200">
+              <a:buFont typeface="Arial" panose="020B0604020202020204" pitchFamily="34" charset="0"/>
+              <a:buChar char="•"/>
+            </a:pPr>
+            <a:endParaRPr lang="pl-PL" sz="2800" dirty="0">
+              <a:solidFill>
+                <a:srgbClr val="0070C0"/>
+              </a:solidFill>
+            </a:endParaRPr>
+          </a:p>
+          <a:p>
+            <a:pPr marL="457200" indent="-457200">
+              <a:buFont typeface="Arial" panose="020B0604020202020204" pitchFamily="34" charset="0"/>
+              <a:buChar char="•"/>
+            </a:pPr>
+            <a:endParaRPr lang="pl-PL" sz="2800" dirty="0">
+              <a:solidFill>
+                <a:srgbClr val="0070C0"/>
+              </a:solidFill>
+            </a:endParaRPr>
+          </a:p>
+          <a:p>
+            <a:pPr marL="457200" indent="-457200">
+              <a:buFont typeface="Arial" panose="020B0604020202020204" pitchFamily="34" charset="0"/>
+              <a:buChar char="•"/>
+            </a:pPr>
+            <a:r>
+              <a:rPr lang="en-GB" sz="2800" dirty="0">
+                <a:solidFill>
+                  <a:srgbClr val="0070C0"/>
+                </a:solidFill>
+              </a:rPr>
+              <a:t>Bulk renaming of files can be done with the software such as Ant </a:t>
+            </a:r>
+            <a:r>
+              <a:rPr lang="en-GB" sz="2800" dirty="0" err="1">
+                <a:solidFill>
+                  <a:srgbClr val="0070C0"/>
+                </a:solidFill>
+              </a:rPr>
+              <a:t>Renamer</a:t>
+            </a:r>
+            <a:r>
+              <a:rPr lang="en-GB" sz="2800" dirty="0">
+                <a:solidFill>
+                  <a:srgbClr val="0070C0"/>
+                </a:solidFill>
+              </a:rPr>
+              <a:t>, </a:t>
+            </a:r>
+            <a:r>
+              <a:rPr lang="en-GB" sz="2800" dirty="0" err="1">
+                <a:solidFill>
+                  <a:srgbClr val="0070C0"/>
+                </a:solidFill>
+              </a:rPr>
+              <a:t>RenameIT</a:t>
+            </a:r>
+            <a:r>
+              <a:rPr lang="en-GB" sz="2800" dirty="0">
+                <a:solidFill>
+                  <a:srgbClr val="0070C0"/>
+                </a:solidFill>
+              </a:rPr>
+              <a:t> or Rename4Mac.</a:t>
+            </a:r>
+          </a:p>
+        </p:txBody>
+      </p:sp>
       <p:pic>
         <p:nvPicPr>
-          <p:cNvPr id="6" name="Picture 2" descr="Ed_DaSH">
-            <a:extLst>
-              <a:ext uri="{FF2B5EF4-FFF2-40B4-BE49-F238E27FC236}">
-                <a16:creationId xmlns:a16="http://schemas.microsoft.com/office/drawing/2014/main" id="{6F3CF586-06D2-46C3-A4A3-130E31C4A16F}"/>
+          <p:cNvPr id="4" name="Picture 2" descr="Ed_DaSH">
+            <a:extLst>
+              <a:ext uri="{FF2B5EF4-FFF2-40B4-BE49-F238E27FC236}">
+                <a16:creationId xmlns:a16="http://schemas.microsoft.com/office/drawing/2014/main" id="{A783256F-E39E-4712-96B0-240BD611CFEB}"/>
               </a:ext>
             </a:extLst>
           </p:cNvPr>
@@ -8371,7 +8406,7 @@
           <p:nvPr/>
         </p:nvPicPr>
         <p:blipFill>
-          <a:blip r:embed="rId3" cstate="hqprint">
+          <a:blip r:embed="rId2" cstate="hqprint">
             <a:extLst>
               <a:ext uri="{28A0092B-C50C-407E-A947-70E740481C1C}">
                 <a14:useLocalDpi xmlns:a14="http://schemas.microsoft.com/office/drawing/2010/main" val="0"/>
@@ -8405,151 +8440,23 @@
       </p:pic>
       <p:sp>
         <p:nvSpPr>
-          <p:cNvPr id="9" name="TextBox 8">
-            <a:extLst>
-              <a:ext uri="{FF2B5EF4-FFF2-40B4-BE49-F238E27FC236}">
-                <a16:creationId xmlns:a16="http://schemas.microsoft.com/office/drawing/2014/main" id="{BAD6A8BB-6E1B-5E43-83C2-4F8F05A73369}"/>
-              </a:ext>
-            </a:extLst>
-          </p:cNvPr>
-          <p:cNvSpPr txBox="1"/>
-          <p:nvPr/>
+          <p:cNvPr id="6" name="Title 1">
+            <a:extLst>
+              <a:ext uri="{FF2B5EF4-FFF2-40B4-BE49-F238E27FC236}">
+                <a16:creationId xmlns:a16="http://schemas.microsoft.com/office/drawing/2014/main" id="{2DAB931A-8376-F04C-8C71-131A697E2222}"/>
+              </a:ext>
+            </a:extLst>
+          </p:cNvPr>
+          <p:cNvSpPr>
+            <a:spLocks noGrp="1"/>
+          </p:cNvSpPr>
+          <p:nvPr>
+            <p:ph type="title"/>
+          </p:nvPr>
         </p:nvSpPr>
         <p:spPr>
           <a:xfrm>
-            <a:off x="948099" y="1355649"/>
-            <a:ext cx="10048452" cy="4401205"/>
-          </a:xfrm>
-          <a:prstGeom prst="rect">
-            <a:avLst/>
-          </a:prstGeom>
-          <a:noFill/>
-        </p:spPr>
-        <p:txBody>
-          <a:bodyPr wrap="square">
-            <a:spAutoFit/>
-          </a:bodyPr>
-          <a:lstStyle/>
-          <a:p>
-            <a:pPr marL="457200" indent="-457200">
-              <a:buFont typeface="Arial" panose="020B0604020202020204" pitchFamily="34" charset="0"/>
-              <a:buChar char="•"/>
-            </a:pPr>
-            <a:r>
-              <a:rPr lang="en-GB" sz="2800" dirty="0">
-                <a:solidFill>
-                  <a:srgbClr val="0070C0"/>
-                </a:solidFill>
-              </a:rPr>
-              <a:t>Back up (almost) everything created by a human or recorded by a machine as soon as it is created.</a:t>
-            </a:r>
-            <a:endParaRPr lang="pl-PL" sz="2800" dirty="0">
-              <a:solidFill>
-                <a:srgbClr val="0070C0"/>
-              </a:solidFill>
-            </a:endParaRPr>
-          </a:p>
-          <a:p>
-            <a:pPr marL="457200" indent="-457200">
-              <a:buFont typeface="Arial" panose="020B0604020202020204" pitchFamily="34" charset="0"/>
-              <a:buChar char="•"/>
-            </a:pPr>
-            <a:endParaRPr lang="en-GB" sz="2800" dirty="0">
-              <a:solidFill>
-                <a:srgbClr val="0070C0"/>
-              </a:solidFill>
-            </a:endParaRPr>
-          </a:p>
-          <a:p>
-            <a:pPr marL="457200" indent="-457200">
-              <a:buFont typeface="Arial" panose="020B0604020202020204" pitchFamily="34" charset="0"/>
-              <a:buChar char="•"/>
-            </a:pPr>
-            <a:r>
-              <a:rPr lang="en-GB" sz="2800" dirty="0">
-                <a:solidFill>
-                  <a:srgbClr val="0070C0"/>
-                </a:solidFill>
-              </a:rPr>
-              <a:t>Always backup your files in 3 places, at least one should be off-site.</a:t>
-            </a:r>
-            <a:endParaRPr lang="pl-PL" sz="2800" dirty="0">
-              <a:solidFill>
-                <a:srgbClr val="0070C0"/>
-              </a:solidFill>
-            </a:endParaRPr>
-          </a:p>
-          <a:p>
-            <a:pPr marL="457200" indent="-457200">
-              <a:buFont typeface="Arial" panose="020B0604020202020204" pitchFamily="34" charset="0"/>
-              <a:buChar char="•"/>
-            </a:pPr>
-            <a:endParaRPr lang="en-GB" sz="2800" dirty="0">
-              <a:solidFill>
-                <a:srgbClr val="0070C0"/>
-              </a:solidFill>
-            </a:endParaRPr>
-          </a:p>
-          <a:p>
-            <a:pPr marL="457200" indent="-457200">
-              <a:buFont typeface="Arial" panose="020B0604020202020204" pitchFamily="34" charset="0"/>
-              <a:buChar char="•"/>
-            </a:pPr>
-            <a:r>
-              <a:rPr lang="en-GB" sz="2800" dirty="0">
-                <a:solidFill>
-                  <a:srgbClr val="0070C0"/>
-                </a:solidFill>
-              </a:rPr>
-              <a:t>USB sticks are a failure-prone option and are not a valid solution for backup of scientific data</a:t>
-            </a:r>
-          </a:p>
-          <a:p>
-            <a:pPr marL="457200" indent="-457200">
-              <a:buFont typeface="Arial" panose="020B0604020202020204" pitchFamily="34" charset="0"/>
-              <a:buChar char="•"/>
-            </a:pPr>
-            <a:endParaRPr lang="en-GB" sz="2800" dirty="0">
-              <a:solidFill>
-                <a:srgbClr val="0070C0"/>
-              </a:solidFill>
-            </a:endParaRPr>
-          </a:p>
-          <a:p>
-            <a:pPr marL="457200" indent="-457200">
-              <a:buFont typeface="Arial" panose="020B0604020202020204" pitchFamily="34" charset="0"/>
-              <a:buChar char="•"/>
-            </a:pPr>
-            <a:r>
-              <a:rPr lang="en-GB" sz="2800" dirty="0">
-                <a:solidFill>
-                  <a:srgbClr val="0070C0"/>
-                </a:solidFill>
-              </a:rPr>
-              <a:t>A robust backup cannot be achieved manually</a:t>
-            </a:r>
-          </a:p>
-        </p:txBody>
-      </p:sp>
-      <p:sp>
-        <p:nvSpPr>
-          <p:cNvPr id="5" name="Title 1">
-            <a:extLst>
-              <a:ext uri="{FF2B5EF4-FFF2-40B4-BE49-F238E27FC236}">
-                <a16:creationId xmlns:a16="http://schemas.microsoft.com/office/drawing/2014/main" id="{A5D34E58-AF9E-4741-A5B2-3ABCF1C42AF5}"/>
-              </a:ext>
-            </a:extLst>
-          </p:cNvPr>
-          <p:cNvSpPr>
-            <a:spLocks noGrp="1"/>
-          </p:cNvSpPr>
-          <p:nvPr>
-            <p:ph type="title"/>
-          </p:nvPr>
-        </p:nvSpPr>
-        <p:spPr>
-          <a:xfrm>
-            <a:off x="838200" y="231013"/>
+            <a:off x="838200" y="365125"/>
             <a:ext cx="10515600" cy="1325563"/>
           </a:xfrm>
         </p:spPr>
@@ -8559,7 +8466,7 @@
           <a:p>
             <a:r>
               <a:rPr lang="en-GB" dirty="0"/>
-              <a:t>Backing up your project files and folders</a:t>
+              <a:t>Plan, plan, revise, update, adhere</a:t>
             </a:r>
           </a:p>
         </p:txBody>
@@ -8567,7 +8474,7 @@
     </p:spTree>
     <p:extLst>
       <p:ext uri="{BB962C8B-B14F-4D97-AF65-F5344CB8AC3E}">
-        <p14:creationId xmlns:p14="http://schemas.microsoft.com/office/powerpoint/2010/main" val="693671975"/>
+        <p14:creationId xmlns:p14="http://schemas.microsoft.com/office/powerpoint/2010/main" val="2278557793"/>
       </p:ext>
     </p:extLst>
   </p:cSld>
@@ -8596,301 +8503,6 @@
       </p:grpSpPr>
       <p:sp>
         <p:nvSpPr>
-          <p:cNvPr id="5" name="TextBox 4">
-            <a:extLst>
-              <a:ext uri="{FF2B5EF4-FFF2-40B4-BE49-F238E27FC236}">
-                <a16:creationId xmlns:a16="http://schemas.microsoft.com/office/drawing/2014/main" id="{3A7A1F5C-9C70-4DE3-BA39-7835B2935EB3}"/>
-              </a:ext>
-            </a:extLst>
-          </p:cNvPr>
-          <p:cNvSpPr txBox="1"/>
-          <p:nvPr/>
-        </p:nvSpPr>
-        <p:spPr>
-          <a:xfrm>
-            <a:off x="1363735" y="1568376"/>
-            <a:ext cx="9464530" cy="4401205"/>
-          </a:xfrm>
-          <a:prstGeom prst="rect">
-            <a:avLst/>
-          </a:prstGeom>
-          <a:noFill/>
-        </p:spPr>
-        <p:txBody>
-          <a:bodyPr wrap="square">
-            <a:spAutoFit/>
-          </a:bodyPr>
-          <a:lstStyle/>
-          <a:p>
-            <a:pPr marL="457200" indent="-457200">
-              <a:buFont typeface="Arial" panose="020B0604020202020204" pitchFamily="34" charset="0"/>
-              <a:buChar char="•"/>
-            </a:pPr>
-            <a:r>
-              <a:rPr lang="en-GB" sz="2800" dirty="0">
-                <a:solidFill>
-                  <a:srgbClr val="0070C0"/>
-                </a:solidFill>
-              </a:rPr>
-              <a:t>If you change the strategy document it in PROJECT_STRUCTURE </a:t>
-            </a:r>
-            <a:br>
-              <a:rPr lang="pl-PL" sz="2800" dirty="0">
-                <a:solidFill>
-                  <a:srgbClr val="0070C0"/>
-                </a:solidFill>
-              </a:rPr>
-            </a:br>
-            <a:r>
-              <a:rPr lang="pl-PL" sz="2800" dirty="0">
-                <a:solidFill>
-                  <a:srgbClr val="0070C0"/>
-                </a:solidFill>
-              </a:rPr>
-              <a:t>(</a:t>
-            </a:r>
-            <a:r>
-              <a:rPr lang="en-GB" sz="2800" dirty="0">
-                <a:solidFill>
-                  <a:srgbClr val="0070C0"/>
-                </a:solidFill>
-              </a:rPr>
-              <a:t>why you made the change and when</a:t>
-            </a:r>
-            <a:r>
-              <a:rPr lang="pl-PL" sz="2800" dirty="0">
-                <a:solidFill>
-                  <a:srgbClr val="0070C0"/>
-                </a:solidFill>
-              </a:rPr>
-              <a:t>)</a:t>
-            </a:r>
-            <a:r>
-              <a:rPr lang="en-GB" sz="2800" dirty="0">
-                <a:solidFill>
-                  <a:srgbClr val="0070C0"/>
-                </a:solidFill>
-              </a:rPr>
-              <a:t> </a:t>
-            </a:r>
-            <a:endParaRPr lang="pl-PL" sz="2800" dirty="0">
-              <a:solidFill>
-                <a:srgbClr val="0070C0"/>
-              </a:solidFill>
-            </a:endParaRPr>
-          </a:p>
-          <a:p>
-            <a:pPr marL="457200" indent="-457200">
-              <a:buFont typeface="Arial" panose="020B0604020202020204" pitchFamily="34" charset="0"/>
-              <a:buChar char="•"/>
-            </a:pPr>
-            <a:endParaRPr lang="pl-PL" sz="2800" dirty="0">
-              <a:solidFill>
-                <a:srgbClr val="0070C0"/>
-              </a:solidFill>
-            </a:endParaRPr>
-          </a:p>
-          <a:p>
-            <a:pPr marL="457200" indent="-457200">
-              <a:buFont typeface="Arial" panose="020B0604020202020204" pitchFamily="34" charset="0"/>
-              <a:buChar char="•"/>
-            </a:pPr>
-            <a:r>
-              <a:rPr lang="en-GB" sz="2800" dirty="0">
-                <a:solidFill>
-                  <a:srgbClr val="0070C0"/>
-                </a:solidFill>
-              </a:rPr>
-              <a:t>Update the locations and names of files which followed the old convention</a:t>
-            </a:r>
-            <a:endParaRPr lang="pl-PL" sz="2800" dirty="0">
-              <a:solidFill>
-                <a:srgbClr val="0070C0"/>
-              </a:solidFill>
-            </a:endParaRPr>
-          </a:p>
-          <a:p>
-            <a:pPr marL="457200" indent="-457200">
-              <a:buFont typeface="Arial" panose="020B0604020202020204" pitchFamily="34" charset="0"/>
-              <a:buChar char="•"/>
-            </a:pPr>
-            <a:endParaRPr lang="pl-PL" sz="2800" dirty="0">
-              <a:solidFill>
-                <a:srgbClr val="0070C0"/>
-              </a:solidFill>
-            </a:endParaRPr>
-          </a:p>
-          <a:p>
-            <a:pPr marL="457200" indent="-457200">
-              <a:buFont typeface="Arial" panose="020B0604020202020204" pitchFamily="34" charset="0"/>
-              <a:buChar char="•"/>
-            </a:pPr>
-            <a:endParaRPr lang="pl-PL" sz="2800" dirty="0">
-              <a:solidFill>
-                <a:srgbClr val="0070C0"/>
-              </a:solidFill>
-            </a:endParaRPr>
-          </a:p>
-          <a:p>
-            <a:pPr marL="457200" indent="-457200">
-              <a:buFont typeface="Arial" panose="020B0604020202020204" pitchFamily="34" charset="0"/>
-              <a:buChar char="•"/>
-            </a:pPr>
-            <a:r>
-              <a:rPr lang="en-GB" sz="2800" dirty="0">
-                <a:solidFill>
-                  <a:srgbClr val="0070C0"/>
-                </a:solidFill>
-              </a:rPr>
-              <a:t>Bulk renaming of files can be done with the software such as Ant </a:t>
-            </a:r>
-            <a:r>
-              <a:rPr lang="en-GB" sz="2800" dirty="0" err="1">
-                <a:solidFill>
-                  <a:srgbClr val="0070C0"/>
-                </a:solidFill>
-              </a:rPr>
-              <a:t>Renamer</a:t>
-            </a:r>
-            <a:r>
-              <a:rPr lang="en-GB" sz="2800" dirty="0">
-                <a:solidFill>
-                  <a:srgbClr val="0070C0"/>
-                </a:solidFill>
-              </a:rPr>
-              <a:t>, </a:t>
-            </a:r>
-            <a:r>
-              <a:rPr lang="en-GB" sz="2800" dirty="0" err="1">
-                <a:solidFill>
-                  <a:srgbClr val="0070C0"/>
-                </a:solidFill>
-              </a:rPr>
-              <a:t>RenameIT</a:t>
-            </a:r>
-            <a:r>
-              <a:rPr lang="en-GB" sz="2800" dirty="0">
-                <a:solidFill>
-                  <a:srgbClr val="0070C0"/>
-                </a:solidFill>
-              </a:rPr>
-              <a:t> or Rename4Mac.</a:t>
-            </a:r>
-          </a:p>
-        </p:txBody>
-      </p:sp>
-      <p:pic>
-        <p:nvPicPr>
-          <p:cNvPr id="4" name="Picture 2" descr="Ed_DaSH">
-            <a:extLst>
-              <a:ext uri="{FF2B5EF4-FFF2-40B4-BE49-F238E27FC236}">
-                <a16:creationId xmlns:a16="http://schemas.microsoft.com/office/drawing/2014/main" id="{A783256F-E39E-4712-96B0-240BD611CFEB}"/>
-              </a:ext>
-            </a:extLst>
-          </p:cNvPr>
-          <p:cNvPicPr>
-            <a:picLocks noChangeAspect="1" noChangeArrowheads="1"/>
-          </p:cNvPicPr>
-          <p:nvPr/>
-        </p:nvPicPr>
-        <p:blipFill>
-          <a:blip r:embed="rId2" cstate="hqprint">
-            <a:extLst>
-              <a:ext uri="{28A0092B-C50C-407E-A947-70E740481C1C}">
-                <a14:useLocalDpi xmlns:a14="http://schemas.microsoft.com/office/drawing/2010/main" val="0"/>
-              </a:ext>
-            </a:extLst>
-          </a:blip>
-          <a:srcRect/>
-          <a:stretch>
-            <a:fillRect/>
-          </a:stretch>
-        </p:blipFill>
-        <p:spPr bwMode="auto">
-          <a:xfrm>
-            <a:off x="10820670" y="5458691"/>
-            <a:ext cx="1289214" cy="1325418"/>
-          </a:xfrm>
-          <a:prstGeom prst="rect">
-            <a:avLst/>
-          </a:prstGeom>
-          <a:noFill/>
-          <a:extLst>
-            <a:ext uri="{909E8E84-426E-40DD-AFC4-6F175D3DCCD1}">
-              <a14:hiddenFill xmlns:a14="http://schemas.microsoft.com/office/drawing/2010/main">
-                <a:solidFill>
-                  <a:srgbClr val="FFFFFF"/>
-                </a:solidFill>
-              </a14:hiddenFill>
-            </a:ext>
-          </a:extLst>
-        </p:spPr>
-      </p:pic>
-      <p:sp>
-        <p:nvSpPr>
-          <p:cNvPr id="6" name="Title 1">
-            <a:extLst>
-              <a:ext uri="{FF2B5EF4-FFF2-40B4-BE49-F238E27FC236}">
-                <a16:creationId xmlns:a16="http://schemas.microsoft.com/office/drawing/2014/main" id="{2DAB931A-8376-F04C-8C71-131A697E2222}"/>
-              </a:ext>
-            </a:extLst>
-          </p:cNvPr>
-          <p:cNvSpPr>
-            <a:spLocks noGrp="1"/>
-          </p:cNvSpPr>
-          <p:nvPr>
-            <p:ph type="title"/>
-          </p:nvPr>
-        </p:nvSpPr>
-        <p:spPr>
-          <a:xfrm>
-            <a:off x="838200" y="365125"/>
-            <a:ext cx="10515600" cy="1325563"/>
-          </a:xfrm>
-        </p:spPr>
-        <p:txBody>
-          <a:bodyPr/>
-          <a:lstStyle/>
-          <a:p>
-            <a:r>
-              <a:rPr lang="en-GB" dirty="0"/>
-              <a:t>Plan, plan, revise, update, adhere</a:t>
-            </a:r>
-          </a:p>
-        </p:txBody>
-      </p:sp>
-    </p:spTree>
-    <p:extLst>
-      <p:ext uri="{BB962C8B-B14F-4D97-AF65-F5344CB8AC3E}">
-        <p14:creationId xmlns:p14="http://schemas.microsoft.com/office/powerpoint/2010/main" val="2278557793"/>
-      </p:ext>
-    </p:extLst>
-  </p:cSld>
-  <p:clrMapOvr>
-    <a:masterClrMapping/>
-  </p:clrMapOvr>
-</p:sld>
-</file>
-
-<file path=ppt/slides/slide25.xml><?xml version="1.0" encoding="utf-8"?>
-<p:sld xmlns:a="http://schemas.openxmlformats.org/drawingml/2006/main" xmlns:r="http://schemas.openxmlformats.org/officeDocument/2006/relationships" xmlns:p="http://schemas.openxmlformats.org/presentationml/2006/main">
-  <p:cSld>
-    <p:spTree>
-      <p:nvGrpSpPr>
-        <p:cNvPr id="1" name=""/>
-        <p:cNvGrpSpPr/>
-        <p:nvPr/>
-      </p:nvGrpSpPr>
-      <p:grpSpPr>
-        <a:xfrm>
-          <a:off x="0" y="0"/>
-          <a:ext cx="0" cy="0"/>
-          <a:chOff x="0" y="0"/>
-          <a:chExt cx="0" cy="0"/>
-        </a:xfrm>
-      </p:grpSpPr>
-      <p:sp>
-        <p:nvSpPr>
           <p:cNvPr id="12" name="TextBox 11">
             <a:extLst>
               <a:ext uri="{FF2B5EF4-FFF2-40B4-BE49-F238E27FC236}">
@@ -8951,7 +8563,7 @@
 </p:sld>
 </file>
 
-<file path=ppt/slides/slide26.xml><?xml version="1.0" encoding="utf-8"?>
+<file path=ppt/slides/slide25.xml><?xml version="1.0" encoding="utf-8"?>
 <p:sld xmlns:a="http://schemas.openxmlformats.org/drawingml/2006/main" xmlns:r="http://schemas.openxmlformats.org/officeDocument/2006/relationships" xmlns:p="http://schemas.openxmlformats.org/presentationml/2006/main">
   <p:cSld>
     <p:spTree>

</xml_diff>